<commit_message>
modified non tech and phase checkpoint
</commit_message>
<xml_diff>
--- a/PHASE TWO NON _TECH.pptx
+++ b/PHASE TWO NON _TECH.pptx
@@ -5,39 +5,39 @@
     <p:sldMasterId id="2147483648" r:id="rId1"/>
   </p:sldMasterIdLst>
   <p:notesMasterIdLst>
-    <p:notesMasterId r:id="rId32"/>
+    <p:notesMasterId r:id="rId4"/>
   </p:notesMasterIdLst>
   <p:sldIdLst>
-    <p:sldId id="265" r:id="rId2"/>
-    <p:sldId id="260" r:id="rId3"/>
-    <p:sldId id="286" r:id="rId4"/>
-    <p:sldId id="302" r:id="rId5"/>
-    <p:sldId id="301" r:id="rId6"/>
-    <p:sldId id="307" r:id="rId7"/>
-    <p:sldId id="303" r:id="rId8"/>
-    <p:sldId id="263" r:id="rId9"/>
-    <p:sldId id="308" r:id="rId10"/>
-    <p:sldId id="294" r:id="rId11"/>
-    <p:sldId id="277" r:id="rId12"/>
-    <p:sldId id="309" r:id="rId13"/>
-    <p:sldId id="284" r:id="rId14"/>
-    <p:sldId id="281" r:id="rId15"/>
-    <p:sldId id="280" r:id="rId16"/>
-    <p:sldId id="258" r:id="rId17"/>
-    <p:sldId id="285" r:id="rId18"/>
-    <p:sldId id="275" r:id="rId19"/>
-    <p:sldId id="264" r:id="rId20"/>
-    <p:sldId id="305" r:id="rId21"/>
-    <p:sldId id="306" r:id="rId22"/>
-    <p:sldId id="300" r:id="rId23"/>
-    <p:sldId id="311" r:id="rId24"/>
-    <p:sldId id="312" r:id="rId25"/>
-    <p:sldId id="313" r:id="rId26"/>
-    <p:sldId id="314" r:id="rId27"/>
-    <p:sldId id="295" r:id="rId28"/>
-    <p:sldId id="304" r:id="rId29"/>
-    <p:sldId id="298" r:id="rId30"/>
-    <p:sldId id="297" r:id="rId31"/>
+    <p:sldId id="265" r:id="rId3"/>
+    <p:sldId id="260" r:id="rId5"/>
+    <p:sldId id="286" r:id="rId6"/>
+    <p:sldId id="302" r:id="rId7"/>
+    <p:sldId id="301" r:id="rId8"/>
+    <p:sldId id="307" r:id="rId9"/>
+    <p:sldId id="303" r:id="rId10"/>
+    <p:sldId id="263" r:id="rId11"/>
+    <p:sldId id="308" r:id="rId12"/>
+    <p:sldId id="294" r:id="rId13"/>
+    <p:sldId id="277" r:id="rId14"/>
+    <p:sldId id="309" r:id="rId15"/>
+    <p:sldId id="284" r:id="rId16"/>
+    <p:sldId id="281" r:id="rId17"/>
+    <p:sldId id="280" r:id="rId18"/>
+    <p:sldId id="258" r:id="rId19"/>
+    <p:sldId id="285" r:id="rId20"/>
+    <p:sldId id="275" r:id="rId21"/>
+    <p:sldId id="264" r:id="rId22"/>
+    <p:sldId id="305" r:id="rId23"/>
+    <p:sldId id="306" r:id="rId24"/>
+    <p:sldId id="300" r:id="rId25"/>
+    <p:sldId id="311" r:id="rId26"/>
+    <p:sldId id="312" r:id="rId27"/>
+    <p:sldId id="313" r:id="rId28"/>
+    <p:sldId id="314" r:id="rId29"/>
+    <p:sldId id="295" r:id="rId30"/>
+    <p:sldId id="304" r:id="rId31"/>
+    <p:sldId id="298" r:id="rId32"/>
+    <p:sldId id="297" r:id="rId33"/>
   </p:sldIdLst>
   <p:sldSz cx="12192000" cy="6858000"/>
   <p:notesSz cx="6858000" cy="9144000"/>
@@ -136,11 +136,6 @@
       </a:defRPr>
     </a:lvl9pPr>
   </p:defaultTextStyle>
-  <p:extLst>
-    <p:ext uri="{EFAFB233-063F-42B5-8137-9DF3F51BA10A}">
-      <p15:sldGuideLst xmlns:p15="http://schemas.microsoft.com/office/powerpoint/2012/main"/>
-    </p:ext>
-  </p:extLst>
 </p:presentation>
 </file>
 
@@ -226,7 +221,6 @@
           <a:p>
             <a:fld id="{3C8DC98E-0935-450B-8735-8E0C5EDF216B}" type="datetimeFigureOut">
               <a:rPr lang="en-US" smtClean="0"/>
-              <a:t>1/18/2025</a:t>
             </a:fld>
             <a:endParaRPr lang="en-US"/>
           </a:p>
@@ -293,6 +287,7 @@
               <a:rPr lang="en-US"/>
               <a:t>Click to edit Master text styles</a:t>
             </a:r>
+            <a:endParaRPr lang="en-US"/>
           </a:p>
           <a:p>
             <a:pPr lvl="1"/>
@@ -300,6 +295,7 @@
               <a:rPr lang="en-US"/>
               <a:t>Second level</a:t>
             </a:r>
+            <a:endParaRPr lang="en-US"/>
           </a:p>
           <a:p>
             <a:pPr lvl="2"/>
@@ -307,6 +303,7 @@
               <a:rPr lang="en-US"/>
               <a:t>Third level</a:t>
             </a:r>
+            <a:endParaRPr lang="en-US"/>
           </a:p>
           <a:p>
             <a:pPr lvl="3"/>
@@ -314,6 +311,7 @@
               <a:rPr lang="en-US"/>
               <a:t>Fourth level</a:t>
             </a:r>
+            <a:endParaRPr lang="en-US"/>
           </a:p>
           <a:p>
             <a:pPr lvl="4"/>
@@ -321,6 +319,7 @@
               <a:rPr lang="en-US"/>
               <a:t>Fifth level</a:t>
             </a:r>
+            <a:endParaRPr lang="en-US"/>
           </a:p>
         </p:txBody>
       </p:sp>
@@ -384,7 +383,6 @@
           <a:p>
             <a:fld id="{B6AC3967-BB65-4606-A24D-E6ADEBE089F7}" type="slidenum">
               <a:rPr lang="en-US" smtClean="0"/>
-              <a:t>‹#›</a:t>
             </a:fld>
             <a:endParaRPr lang="en-US"/>
           </a:p>
@@ -553,7 +551,6 @@
           <a:p>
             <a:fld id="{9268FF88-4020-46A2-AED2-9D5F0886B732}" type="slidenum">
               <a:rPr lang="en-US" smtClean="0"/>
-              <a:t>1</a:t>
             </a:fld>
             <a:endParaRPr lang="en-US"/>
           </a:p>
@@ -632,7 +629,6 @@
           <a:p>
             <a:fld id="{B6AC3967-BB65-4606-A24D-E6ADEBE089F7}" type="slidenum">
               <a:rPr lang="en-US" smtClean="0"/>
-              <a:t>19</a:t>
             </a:fld>
             <a:endParaRPr lang="en-US"/>
           </a:p>
@@ -711,7 +707,6 @@
           <a:p>
             <a:fld id="{B6AC3967-BB65-4606-A24D-E6ADEBE089F7}" type="slidenum">
               <a:rPr lang="en-US" smtClean="0"/>
-              <a:t>20</a:t>
             </a:fld>
             <a:endParaRPr lang="en-US"/>
           </a:p>
@@ -790,7 +785,6 @@
           <a:p>
             <a:fld id="{B6AC3967-BB65-4606-A24D-E6ADEBE089F7}" type="slidenum">
               <a:rPr lang="en-US" smtClean="0"/>
-              <a:t>21</a:t>
             </a:fld>
             <a:endParaRPr lang="en-US"/>
           </a:p>
@@ -809,13 +803,7 @@
   <p:cSld>
     <p:spTree>
       <p:nvGrpSpPr>
-        <p:cNvPr id="1" name="">
-          <a:extLst>
-            <a:ext uri="{FF2B5EF4-FFF2-40B4-BE49-F238E27FC236}">
-              <a16:creationId xmlns:a16="http://schemas.microsoft.com/office/drawing/2014/main" id="{27F6634D-EE06-B5D3-051F-D39F9EF166A4}"/>
-            </a:ext>
-          </a:extLst>
-        </p:cNvPr>
+        <p:cNvPr id="1" name=""/>
         <p:cNvGrpSpPr/>
         <p:nvPr/>
       </p:nvGrpSpPr>
@@ -829,13 +817,7 @@
       </p:grpSpPr>
       <p:sp>
         <p:nvSpPr>
-          <p:cNvPr id="2" name="Slide Image Placeholder 1">
-            <a:extLst>
-              <a:ext uri="{FF2B5EF4-FFF2-40B4-BE49-F238E27FC236}">
-                <a16:creationId xmlns:a16="http://schemas.microsoft.com/office/drawing/2014/main" id="{244EF6AA-8012-763E-AAA7-D341D140579E}"/>
-              </a:ext>
-            </a:extLst>
-          </p:cNvPr>
+          <p:cNvPr id="2" name="Slide Image Placeholder 1"/>
           <p:cNvSpPr>
             <a:spLocks noGrp="1" noRot="1" noChangeAspect="1"/>
           </p:cNvSpPr>
@@ -847,13 +829,7 @@
       </p:sp>
       <p:sp>
         <p:nvSpPr>
-          <p:cNvPr id="3" name="Notes Placeholder 2">
-            <a:extLst>
-              <a:ext uri="{FF2B5EF4-FFF2-40B4-BE49-F238E27FC236}">
-                <a16:creationId xmlns:a16="http://schemas.microsoft.com/office/drawing/2014/main" id="{F11A5544-4E41-0C9D-47FB-85CA5C177EB5}"/>
-              </a:ext>
-            </a:extLst>
-          </p:cNvPr>
+          <p:cNvPr id="3" name="Notes Placeholder 2"/>
           <p:cNvSpPr>
             <a:spLocks noGrp="1"/>
           </p:cNvSpPr>
@@ -872,13 +848,7 @@
       </p:sp>
       <p:sp>
         <p:nvSpPr>
-          <p:cNvPr id="4" name="Slide Number Placeholder 3">
-            <a:extLst>
-              <a:ext uri="{FF2B5EF4-FFF2-40B4-BE49-F238E27FC236}">
-                <a16:creationId xmlns:a16="http://schemas.microsoft.com/office/drawing/2014/main" id="{5D4B264F-7656-2E6C-FE5E-4E895E61672F}"/>
-              </a:ext>
-            </a:extLst>
-          </p:cNvPr>
+          <p:cNvPr id="4" name="Slide Number Placeholder 3"/>
           <p:cNvSpPr>
             <a:spLocks noGrp="1"/>
           </p:cNvSpPr>
@@ -893,18 +863,12 @@
           <a:p>
             <a:fld id="{B6AC3967-BB65-4606-A24D-E6ADEBE089F7}" type="slidenum">
               <a:rPr lang="en-US" smtClean="0"/>
-              <a:t>23</a:t>
             </a:fld>
             <a:endParaRPr lang="en-US"/>
           </a:p>
         </p:txBody>
       </p:sp>
     </p:spTree>
-    <p:extLst>
-      <p:ext uri="{BB962C8B-B14F-4D97-AF65-F5344CB8AC3E}">
-        <p14:creationId xmlns:p14="http://schemas.microsoft.com/office/powerpoint/2010/main" val="1942347624"/>
-      </p:ext>
-    </p:extLst>
   </p:cSld>
   <p:clrMapOvr>
     <a:masterClrMapping/>
@@ -917,13 +881,7 @@
   <p:cSld>
     <p:spTree>
       <p:nvGrpSpPr>
-        <p:cNvPr id="1" name="">
-          <a:extLst>
-            <a:ext uri="{FF2B5EF4-FFF2-40B4-BE49-F238E27FC236}">
-              <a16:creationId xmlns:a16="http://schemas.microsoft.com/office/drawing/2014/main" id="{0562A8CA-D482-1407-FE98-2FDBAE66EAE6}"/>
-            </a:ext>
-          </a:extLst>
-        </p:cNvPr>
+        <p:cNvPr id="1" name=""/>
         <p:cNvGrpSpPr/>
         <p:nvPr/>
       </p:nvGrpSpPr>
@@ -937,13 +895,7 @@
       </p:grpSpPr>
       <p:sp>
         <p:nvSpPr>
-          <p:cNvPr id="2" name="Slide Image Placeholder 1">
-            <a:extLst>
-              <a:ext uri="{FF2B5EF4-FFF2-40B4-BE49-F238E27FC236}">
-                <a16:creationId xmlns:a16="http://schemas.microsoft.com/office/drawing/2014/main" id="{819857A9-CF97-45BE-425E-C594B4C72EE2}"/>
-              </a:ext>
-            </a:extLst>
-          </p:cNvPr>
+          <p:cNvPr id="2" name="Slide Image Placeholder 1"/>
           <p:cNvSpPr>
             <a:spLocks noGrp="1" noRot="1" noChangeAspect="1"/>
           </p:cNvSpPr>
@@ -955,13 +907,7 @@
       </p:sp>
       <p:sp>
         <p:nvSpPr>
-          <p:cNvPr id="3" name="Notes Placeholder 2">
-            <a:extLst>
-              <a:ext uri="{FF2B5EF4-FFF2-40B4-BE49-F238E27FC236}">
-                <a16:creationId xmlns:a16="http://schemas.microsoft.com/office/drawing/2014/main" id="{8841AD49-291E-5B89-4865-0C2D77B7D1BB}"/>
-              </a:ext>
-            </a:extLst>
-          </p:cNvPr>
+          <p:cNvPr id="3" name="Notes Placeholder 2"/>
           <p:cNvSpPr>
             <a:spLocks noGrp="1"/>
           </p:cNvSpPr>
@@ -980,13 +926,7 @@
       </p:sp>
       <p:sp>
         <p:nvSpPr>
-          <p:cNvPr id="4" name="Slide Number Placeholder 3">
-            <a:extLst>
-              <a:ext uri="{FF2B5EF4-FFF2-40B4-BE49-F238E27FC236}">
-                <a16:creationId xmlns:a16="http://schemas.microsoft.com/office/drawing/2014/main" id="{3F78A475-40F9-A223-6065-F609B77FF4EC}"/>
-              </a:ext>
-            </a:extLst>
-          </p:cNvPr>
+          <p:cNvPr id="4" name="Slide Number Placeholder 3"/>
           <p:cNvSpPr>
             <a:spLocks noGrp="1"/>
           </p:cNvSpPr>
@@ -1001,18 +941,12 @@
           <a:p>
             <a:fld id="{B6AC3967-BB65-4606-A24D-E6ADEBE089F7}" type="slidenum">
               <a:rPr lang="en-US" smtClean="0"/>
-              <a:t>24</a:t>
             </a:fld>
             <a:endParaRPr lang="en-US"/>
           </a:p>
         </p:txBody>
       </p:sp>
     </p:spTree>
-    <p:extLst>
-      <p:ext uri="{BB962C8B-B14F-4D97-AF65-F5344CB8AC3E}">
-        <p14:creationId xmlns:p14="http://schemas.microsoft.com/office/powerpoint/2010/main" val="3766970320"/>
-      </p:ext>
-    </p:extLst>
   </p:cSld>
   <p:clrMapOvr>
     <a:masterClrMapping/>
@@ -1025,13 +959,7 @@
   <p:cSld>
     <p:spTree>
       <p:nvGrpSpPr>
-        <p:cNvPr id="1" name="">
-          <a:extLst>
-            <a:ext uri="{FF2B5EF4-FFF2-40B4-BE49-F238E27FC236}">
-              <a16:creationId xmlns:a16="http://schemas.microsoft.com/office/drawing/2014/main" id="{EBF8E403-6F23-0C9F-F4CF-67E697473AEC}"/>
-            </a:ext>
-          </a:extLst>
-        </p:cNvPr>
+        <p:cNvPr id="1" name=""/>
         <p:cNvGrpSpPr/>
         <p:nvPr/>
       </p:nvGrpSpPr>
@@ -1045,13 +973,7 @@
       </p:grpSpPr>
       <p:sp>
         <p:nvSpPr>
-          <p:cNvPr id="2" name="Slide Image Placeholder 1">
-            <a:extLst>
-              <a:ext uri="{FF2B5EF4-FFF2-40B4-BE49-F238E27FC236}">
-                <a16:creationId xmlns:a16="http://schemas.microsoft.com/office/drawing/2014/main" id="{7838735E-A275-E4D8-C04D-70EC53C4E765}"/>
-              </a:ext>
-            </a:extLst>
-          </p:cNvPr>
+          <p:cNvPr id="2" name="Slide Image Placeholder 1"/>
           <p:cNvSpPr>
             <a:spLocks noGrp="1" noRot="1" noChangeAspect="1"/>
           </p:cNvSpPr>
@@ -1063,13 +985,7 @@
       </p:sp>
       <p:sp>
         <p:nvSpPr>
-          <p:cNvPr id="3" name="Notes Placeholder 2">
-            <a:extLst>
-              <a:ext uri="{FF2B5EF4-FFF2-40B4-BE49-F238E27FC236}">
-                <a16:creationId xmlns:a16="http://schemas.microsoft.com/office/drawing/2014/main" id="{4ACF7705-8594-DB2F-B9EF-140042C08E40}"/>
-              </a:ext>
-            </a:extLst>
-          </p:cNvPr>
+          <p:cNvPr id="3" name="Notes Placeholder 2"/>
           <p:cNvSpPr>
             <a:spLocks noGrp="1"/>
           </p:cNvSpPr>
@@ -1088,13 +1004,7 @@
       </p:sp>
       <p:sp>
         <p:nvSpPr>
-          <p:cNvPr id="4" name="Slide Number Placeholder 3">
-            <a:extLst>
-              <a:ext uri="{FF2B5EF4-FFF2-40B4-BE49-F238E27FC236}">
-                <a16:creationId xmlns:a16="http://schemas.microsoft.com/office/drawing/2014/main" id="{94C29DC1-07E1-3B78-62EA-2EBE6F64D483}"/>
-              </a:ext>
-            </a:extLst>
-          </p:cNvPr>
+          <p:cNvPr id="4" name="Slide Number Placeholder 3"/>
           <p:cNvSpPr>
             <a:spLocks noGrp="1"/>
           </p:cNvSpPr>
@@ -1109,18 +1019,12 @@
           <a:p>
             <a:fld id="{B6AC3967-BB65-4606-A24D-E6ADEBE089F7}" type="slidenum">
               <a:rPr lang="en-US" smtClean="0"/>
-              <a:t>25</a:t>
             </a:fld>
             <a:endParaRPr lang="en-US"/>
           </a:p>
         </p:txBody>
       </p:sp>
     </p:spTree>
-    <p:extLst>
-      <p:ext uri="{BB962C8B-B14F-4D97-AF65-F5344CB8AC3E}">
-        <p14:creationId xmlns:p14="http://schemas.microsoft.com/office/powerpoint/2010/main" val="3284945310"/>
-      </p:ext>
-    </p:extLst>
   </p:cSld>
   <p:clrMapOvr>
     <a:masterClrMapping/>
@@ -1133,13 +1037,7 @@
   <p:cSld>
     <p:spTree>
       <p:nvGrpSpPr>
-        <p:cNvPr id="1" name="">
-          <a:extLst>
-            <a:ext uri="{FF2B5EF4-FFF2-40B4-BE49-F238E27FC236}">
-              <a16:creationId xmlns:a16="http://schemas.microsoft.com/office/drawing/2014/main" id="{6056EA2C-25F8-DCEC-8765-58C3DFF3C7B3}"/>
-            </a:ext>
-          </a:extLst>
-        </p:cNvPr>
+        <p:cNvPr id="1" name=""/>
         <p:cNvGrpSpPr/>
         <p:nvPr/>
       </p:nvGrpSpPr>
@@ -1153,13 +1051,7 @@
       </p:grpSpPr>
       <p:sp>
         <p:nvSpPr>
-          <p:cNvPr id="2" name="Slide Image Placeholder 1">
-            <a:extLst>
-              <a:ext uri="{FF2B5EF4-FFF2-40B4-BE49-F238E27FC236}">
-                <a16:creationId xmlns:a16="http://schemas.microsoft.com/office/drawing/2014/main" id="{00B043D0-BAF1-73F0-0057-899C8082CAE9}"/>
-              </a:ext>
-            </a:extLst>
-          </p:cNvPr>
+          <p:cNvPr id="2" name="Slide Image Placeholder 1"/>
           <p:cNvSpPr>
             <a:spLocks noGrp="1" noRot="1" noChangeAspect="1"/>
           </p:cNvSpPr>
@@ -1171,13 +1063,7 @@
       </p:sp>
       <p:sp>
         <p:nvSpPr>
-          <p:cNvPr id="3" name="Notes Placeholder 2">
-            <a:extLst>
-              <a:ext uri="{FF2B5EF4-FFF2-40B4-BE49-F238E27FC236}">
-                <a16:creationId xmlns:a16="http://schemas.microsoft.com/office/drawing/2014/main" id="{B5DC4187-4A82-CB61-FA31-14209C5F013D}"/>
-              </a:ext>
-            </a:extLst>
-          </p:cNvPr>
+          <p:cNvPr id="3" name="Notes Placeholder 2"/>
           <p:cNvSpPr>
             <a:spLocks noGrp="1"/>
           </p:cNvSpPr>
@@ -1196,13 +1082,7 @@
       </p:sp>
       <p:sp>
         <p:nvSpPr>
-          <p:cNvPr id="4" name="Slide Number Placeholder 3">
-            <a:extLst>
-              <a:ext uri="{FF2B5EF4-FFF2-40B4-BE49-F238E27FC236}">
-                <a16:creationId xmlns:a16="http://schemas.microsoft.com/office/drawing/2014/main" id="{508FD2C4-99FD-4FDC-B7C3-CC387D830FAA}"/>
-              </a:ext>
-            </a:extLst>
-          </p:cNvPr>
+          <p:cNvPr id="4" name="Slide Number Placeholder 3"/>
           <p:cNvSpPr>
             <a:spLocks noGrp="1"/>
           </p:cNvSpPr>
@@ -1217,18 +1097,12 @@
           <a:p>
             <a:fld id="{B6AC3967-BB65-4606-A24D-E6ADEBE089F7}" type="slidenum">
               <a:rPr lang="en-US" smtClean="0"/>
-              <a:t>26</a:t>
             </a:fld>
             <a:endParaRPr lang="en-US"/>
           </a:p>
         </p:txBody>
       </p:sp>
     </p:spTree>
-    <p:extLst>
-      <p:ext uri="{BB962C8B-B14F-4D97-AF65-F5344CB8AC3E}">
-        <p14:creationId xmlns:p14="http://schemas.microsoft.com/office/powerpoint/2010/main" val="1352218743"/>
-      </p:ext>
-    </p:extLst>
   </p:cSld>
   <p:clrMapOvr>
     <a:masterClrMapping/>
@@ -1284,6 +1158,7 @@
               <a:rPr lang="en-US" dirty="0"/>
               <a:t>fig1:The highly rated genre is drama.</a:t>
             </a:r>
+            <a:endParaRPr lang="en-US" dirty="0"/>
           </a:p>
         </p:txBody>
       </p:sp>
@@ -1304,7 +1179,6 @@
           <a:p>
             <a:fld id="{B6AC3967-BB65-4606-A24D-E6ADEBE089F7}" type="slidenum">
               <a:rPr lang="en-US" smtClean="0"/>
-              <a:t>11</a:t>
             </a:fld>
             <a:endParaRPr lang="en-US"/>
           </a:p>
@@ -1323,13 +1197,7 @@
   <p:cSld>
     <p:spTree>
       <p:nvGrpSpPr>
-        <p:cNvPr id="1" name="">
-          <a:extLst>
-            <a:ext uri="{FF2B5EF4-FFF2-40B4-BE49-F238E27FC236}">
-              <a16:creationId xmlns:a16="http://schemas.microsoft.com/office/drawing/2014/main" id="{E8F2403C-CA6D-0D4F-B4A8-BBFDA65241B2}"/>
-            </a:ext>
-          </a:extLst>
-        </p:cNvPr>
+        <p:cNvPr id="1" name=""/>
         <p:cNvGrpSpPr/>
         <p:nvPr/>
       </p:nvGrpSpPr>
@@ -1343,13 +1211,7 @@
       </p:grpSpPr>
       <p:sp>
         <p:nvSpPr>
-          <p:cNvPr id="2" name="Slide Image Placeholder 1">
-            <a:extLst>
-              <a:ext uri="{FF2B5EF4-FFF2-40B4-BE49-F238E27FC236}">
-                <a16:creationId xmlns:a16="http://schemas.microsoft.com/office/drawing/2014/main" id="{B85D1AA8-5BEA-B14F-7605-D00303FFD102}"/>
-              </a:ext>
-            </a:extLst>
-          </p:cNvPr>
+          <p:cNvPr id="2" name="Slide Image Placeholder 1"/>
           <p:cNvSpPr>
             <a:spLocks noGrp="1" noRot="1" noChangeAspect="1"/>
           </p:cNvSpPr>
@@ -1361,13 +1223,7 @@
       </p:sp>
       <p:sp>
         <p:nvSpPr>
-          <p:cNvPr id="3" name="Notes Placeholder 2">
-            <a:extLst>
-              <a:ext uri="{FF2B5EF4-FFF2-40B4-BE49-F238E27FC236}">
-                <a16:creationId xmlns:a16="http://schemas.microsoft.com/office/drawing/2014/main" id="{2D6763DC-880F-C079-08B2-D412DEB13CA7}"/>
-              </a:ext>
-            </a:extLst>
-          </p:cNvPr>
+          <p:cNvPr id="3" name="Notes Placeholder 2"/>
           <p:cNvSpPr>
             <a:spLocks noGrp="1"/>
           </p:cNvSpPr>
@@ -1384,18 +1240,13 @@
               <a:rPr lang="en-US" dirty="0"/>
               <a:t>fig1:The highly rated genre is drama.</a:t>
             </a:r>
-          </a:p>
-        </p:txBody>
-      </p:sp>
-      <p:sp>
-        <p:nvSpPr>
-          <p:cNvPr id="4" name="Slide Number Placeholder 3">
-            <a:extLst>
-              <a:ext uri="{FF2B5EF4-FFF2-40B4-BE49-F238E27FC236}">
-                <a16:creationId xmlns:a16="http://schemas.microsoft.com/office/drawing/2014/main" id="{FA5E6995-D32B-C2C5-3A20-1EAF6B65F540}"/>
-              </a:ext>
-            </a:extLst>
-          </p:cNvPr>
+            <a:endParaRPr lang="en-US" dirty="0"/>
+          </a:p>
+        </p:txBody>
+      </p:sp>
+      <p:sp>
+        <p:nvSpPr>
+          <p:cNvPr id="4" name="Slide Number Placeholder 3"/>
           <p:cNvSpPr>
             <a:spLocks noGrp="1"/>
           </p:cNvSpPr>
@@ -1410,18 +1261,12 @@
           <a:p>
             <a:fld id="{B6AC3967-BB65-4606-A24D-E6ADEBE089F7}" type="slidenum">
               <a:rPr lang="en-US" smtClean="0"/>
-              <a:t>12</a:t>
             </a:fld>
             <a:endParaRPr lang="en-US"/>
           </a:p>
         </p:txBody>
       </p:sp>
     </p:spTree>
-    <p:extLst>
-      <p:ext uri="{BB962C8B-B14F-4D97-AF65-F5344CB8AC3E}">
-        <p14:creationId xmlns:p14="http://schemas.microsoft.com/office/powerpoint/2010/main" val="1069777650"/>
-      </p:ext>
-    </p:extLst>
   </p:cSld>
   <p:clrMapOvr>
     <a:masterClrMapping/>
@@ -1477,6 +1322,7 @@
               <a:rPr lang="en-US" dirty="0"/>
               <a:t>Fig 3:movies and films from Jay roach made highest sales followed by Mel Gibson and Sam Mendes.</a:t>
             </a:r>
+            <a:endParaRPr lang="en-US" dirty="0"/>
           </a:p>
         </p:txBody>
       </p:sp>
@@ -1497,7 +1343,6 @@
           <a:p>
             <a:fld id="{B6AC3967-BB65-4606-A24D-E6ADEBE089F7}" type="slidenum">
               <a:rPr lang="en-US" smtClean="0"/>
-              <a:t>13</a:t>
             </a:fld>
             <a:endParaRPr lang="en-US"/>
           </a:p>
@@ -1567,6 +1412,7 @@
               <a:rPr lang="en-US" dirty="0"/>
               <a:t> from Eden Movies.</a:t>
             </a:r>
+            <a:endParaRPr lang="en-US" dirty="0"/>
           </a:p>
         </p:txBody>
       </p:sp>
@@ -1587,7 +1433,6 @@
           <a:p>
             <a:fld id="{B6AC3967-BB65-4606-A24D-E6ADEBE089F7}" type="slidenum">
               <a:rPr lang="en-US" smtClean="0"/>
-              <a:t>14</a:t>
             </a:fld>
             <a:endParaRPr lang="en-US"/>
           </a:p>
@@ -1649,6 +1494,7 @@
               <a:rPr lang="en-US" dirty="0"/>
               <a:t>Fig 5:Drama was the most popular genre doubling the other categories.</a:t>
             </a:r>
+            <a:endParaRPr lang="en-US" dirty="0"/>
           </a:p>
         </p:txBody>
       </p:sp>
@@ -1669,7 +1515,6 @@
           <a:p>
             <a:fld id="{B6AC3967-BB65-4606-A24D-E6ADEBE089F7}" type="slidenum">
               <a:rPr lang="en-US" smtClean="0"/>
-              <a:t>15</a:t>
             </a:fld>
             <a:endParaRPr lang="en-US"/>
           </a:p>
@@ -1748,7 +1593,6 @@
           <a:p>
             <a:fld id="{B6AC3967-BB65-4606-A24D-E6ADEBE089F7}" type="slidenum">
               <a:rPr lang="en-US" smtClean="0"/>
-              <a:t>16</a:t>
             </a:fld>
             <a:endParaRPr lang="en-US"/>
           </a:p>
@@ -1810,6 +1654,7 @@
               <a:rPr lang="en-US" dirty="0"/>
               <a:t>Fig 7:R,PG-13,PG IN Descending order of popularity.</a:t>
             </a:r>
+            <a:endParaRPr lang="en-US" dirty="0"/>
           </a:p>
         </p:txBody>
       </p:sp>
@@ -1830,7 +1675,6 @@
           <a:p>
             <a:fld id="{B6AC3967-BB65-4606-A24D-E6ADEBE089F7}" type="slidenum">
               <a:rPr lang="en-US" smtClean="0"/>
-              <a:t>17</a:t>
             </a:fld>
             <a:endParaRPr lang="en-US"/>
           </a:p>
@@ -1909,7 +1753,6 @@
           <a:p>
             <a:fld id="{B6AC3967-BB65-4606-A24D-E6ADEBE089F7}" type="slidenum">
               <a:rPr lang="en-US" smtClean="0"/>
-              <a:t>18</a:t>
             </a:fld>
             <a:endParaRPr lang="en-US"/>
           </a:p>
@@ -1924,7 +1767,7 @@
 </file>
 
 <file path=ppt/slideLayouts/slideLayout1.xml><?xml version="1.0" encoding="utf-8"?>
-<p:sldLayout xmlns:a="http://schemas.openxmlformats.org/drawingml/2006/main" xmlns:r="http://schemas.openxmlformats.org/officeDocument/2006/relationships" xmlns:p="http://schemas.openxmlformats.org/presentationml/2006/main" showMasterSp="0" type="title" preserve="1">
+<p:sldLayout xmlns:a="http://schemas.openxmlformats.org/drawingml/2006/main" xmlns:r="http://schemas.openxmlformats.org/officeDocument/2006/relationships" xmlns:p="http://schemas.openxmlformats.org/presentationml/2006/main" type="title" preserve="1" showMasterSp="0">
   <p:cSld name="Title Slide">
     <p:spTree>
       <p:nvGrpSpPr>
@@ -2668,7 +2511,6 @@
           <a:p>
             <a:fld id="{B6C044C0-9916-4112-8D28-631360530F20}" type="datetime8">
               <a:rPr lang="en-US" smtClean="0"/>
-              <a:t>1/18/2025 1:19 PM</a:t>
             </a:fld>
             <a:endParaRPr lang="en-US"/>
           </a:p>
@@ -2714,7 +2556,6 @@
           <a:p>
             <a:fld id="{C4C7283F-616F-4503-ABBD-21FFB2848302}" type="slidenum">
               <a:rPr lang="en-US" smtClean="0"/>
-              <a:t>‹#›</a:t>
             </a:fld>
             <a:endParaRPr lang="en-US"/>
           </a:p>
@@ -2898,6 +2739,7 @@
               <a:rPr lang="en-US"/>
               <a:t>Click to edit Master text styles</a:t>
             </a:r>
+            <a:endParaRPr lang="en-US"/>
           </a:p>
         </p:txBody>
       </p:sp>
@@ -2918,7 +2760,6 @@
           <a:p>
             <a:fld id="{D2102445-0A49-423B-9D83-53E1553DDBB8}" type="datetime8">
               <a:rPr lang="en-US" smtClean="0"/>
-              <a:t>1/18/2025 1:19 PM</a:t>
             </a:fld>
             <a:endParaRPr lang="en-US"/>
           </a:p>
@@ -2964,7 +2805,6 @@
           <a:p>
             <a:fld id="{C4C7283F-616F-4503-ABBD-21FFB2848302}" type="slidenum">
               <a:rPr lang="en-US" smtClean="0"/>
-              <a:t>‹#›</a:t>
             </a:fld>
             <a:endParaRPr lang="en-US"/>
           </a:p>
@@ -3089,6 +2929,7 @@
               <a:rPr lang="en-US"/>
               <a:t>Click to edit Master text styles</a:t>
             </a:r>
+            <a:endParaRPr lang="en-US"/>
           </a:p>
         </p:txBody>
       </p:sp>
@@ -3211,6 +3052,7 @@
               <a:rPr lang="en-US"/>
               <a:t>Click to edit Master text styles</a:t>
             </a:r>
+            <a:endParaRPr lang="en-US"/>
           </a:p>
         </p:txBody>
       </p:sp>
@@ -3231,7 +3073,6 @@
           <a:p>
             <a:fld id="{C3921CA2-459C-431F-9285-946548AA4FB4}" type="datetime8">
               <a:rPr lang="en-US" smtClean="0"/>
-              <a:t>1/18/2025 1:19 PM</a:t>
             </a:fld>
             <a:endParaRPr lang="en-US"/>
           </a:p>
@@ -3277,7 +3118,6 @@
           <a:p>
             <a:fld id="{C4C7283F-616F-4503-ABBD-21FFB2848302}" type="slidenum">
               <a:rPr lang="en-US" smtClean="0"/>
-              <a:t>‹#›</a:t>
             </a:fld>
             <a:endParaRPr lang="en-US"/>
           </a:p>
@@ -3321,6 +3161,19 @@
               </a:rPr>
               <a:t>“</a:t>
             </a:r>
+            <a:endParaRPr lang="en-US" sz="8000" baseline="0" dirty="0">
+              <a:ln w="3175" cmpd="sng">
+                <a:noFill/>
+              </a:ln>
+              <a:solidFill>
+                <a:schemeClr val="accent1">
+                  <a:lumMod val="60000"/>
+                  <a:lumOff val="40000"/>
+                </a:schemeClr>
+              </a:solidFill>
+              <a:effectLst/>
+              <a:latin typeface="Arial" panose="020B0604020202020204"/>
+            </a:endParaRPr>
           </a:p>
         </p:txBody>
       </p:sp>
@@ -3362,6 +3215,19 @@
               </a:rPr>
               <a:t>”</a:t>
             </a:r>
+            <a:endParaRPr lang="en-US" sz="8000" baseline="0" dirty="0">
+              <a:ln w="3175" cmpd="sng">
+                <a:noFill/>
+              </a:ln>
+              <a:solidFill>
+                <a:schemeClr val="accent1">
+                  <a:lumMod val="60000"/>
+                  <a:lumOff val="40000"/>
+                </a:schemeClr>
+              </a:solidFill>
+              <a:effectLst/>
+              <a:latin typeface="Arial" panose="020B0604020202020204"/>
+            </a:endParaRPr>
           </a:p>
         </p:txBody>
       </p:sp>
@@ -3543,6 +3409,7 @@
               <a:rPr lang="en-US"/>
               <a:t>Click to edit Master text styles</a:t>
             </a:r>
+            <a:endParaRPr lang="en-US"/>
           </a:p>
         </p:txBody>
       </p:sp>
@@ -3563,7 +3430,6 @@
           <a:p>
             <a:fld id="{E4BF1266-03E0-45A9-B1E3-D5422494BD60}" type="datetime8">
               <a:rPr lang="en-US" smtClean="0"/>
-              <a:t>1/18/2025 1:19 PM</a:t>
             </a:fld>
             <a:endParaRPr lang="en-US"/>
           </a:p>
@@ -3609,7 +3475,6 @@
           <a:p>
             <a:fld id="{C4C7283F-616F-4503-ABBD-21FFB2848302}" type="slidenum">
               <a:rPr lang="en-US" smtClean="0"/>
-              <a:t>‹#›</a:t>
             </a:fld>
             <a:endParaRPr lang="en-US"/>
           </a:p>
@@ -3734,6 +3599,7 @@
               <a:rPr lang="en-US"/>
               <a:t>Click to edit Master text styles</a:t>
             </a:r>
+            <a:endParaRPr lang="en-US"/>
           </a:p>
         </p:txBody>
       </p:sp>
@@ -3856,6 +3722,7 @@
               <a:rPr lang="en-US"/>
               <a:t>Click to edit Master text styles</a:t>
             </a:r>
+            <a:endParaRPr lang="en-US"/>
           </a:p>
         </p:txBody>
       </p:sp>
@@ -3876,7 +3743,6 @@
           <a:p>
             <a:fld id="{C8FADDD5-B153-4219-94B0-1FF50A6816A5}" type="datetime8">
               <a:rPr lang="en-US" smtClean="0"/>
-              <a:t>1/18/2025 1:19 PM</a:t>
             </a:fld>
             <a:endParaRPr lang="en-US"/>
           </a:p>
@@ -3922,7 +3788,6 @@
           <a:p>
             <a:fld id="{C4C7283F-616F-4503-ABBD-21FFB2848302}" type="slidenum">
               <a:rPr lang="en-US" smtClean="0"/>
-              <a:t>‹#›</a:t>
             </a:fld>
             <a:endParaRPr lang="en-US"/>
           </a:p>
@@ -3966,6 +3831,19 @@
               </a:rPr>
               <a:t>“</a:t>
             </a:r>
+            <a:endParaRPr lang="en-US" sz="8000" baseline="0" dirty="0">
+              <a:ln w="3175" cmpd="sng">
+                <a:noFill/>
+              </a:ln>
+              <a:solidFill>
+                <a:schemeClr val="accent1">
+                  <a:lumMod val="60000"/>
+                  <a:lumOff val="40000"/>
+                </a:schemeClr>
+              </a:solidFill>
+              <a:effectLst/>
+              <a:latin typeface="Arial" panose="020B0604020202020204"/>
+            </a:endParaRPr>
           </a:p>
         </p:txBody>
       </p:sp>
@@ -4007,6 +3885,19 @@
               </a:rPr>
               <a:t>”</a:t>
             </a:r>
+            <a:endParaRPr lang="en-US" sz="8000" baseline="0" dirty="0">
+              <a:ln w="3175" cmpd="sng">
+                <a:noFill/>
+              </a:ln>
+              <a:solidFill>
+                <a:schemeClr val="accent1">
+                  <a:lumMod val="60000"/>
+                  <a:lumOff val="40000"/>
+                </a:schemeClr>
+              </a:solidFill>
+              <a:effectLst/>
+              <a:latin typeface="Arial" panose="020B0604020202020204"/>
+            </a:endParaRPr>
           </a:p>
         </p:txBody>
       </p:sp>
@@ -4126,6 +4017,7 @@
               <a:rPr lang="en-US"/>
               <a:t>Click to edit Master text styles</a:t>
             </a:r>
+            <a:endParaRPr lang="en-US"/>
           </a:p>
         </p:txBody>
       </p:sp>
@@ -4248,6 +4140,7 @@
               <a:rPr lang="en-US"/>
               <a:t>Click to edit Master text styles</a:t>
             </a:r>
+            <a:endParaRPr lang="en-US"/>
           </a:p>
         </p:txBody>
       </p:sp>
@@ -4268,7 +4161,6 @@
           <a:p>
             <a:fld id="{FFBC6F1A-280C-41CB-A477-07CA795B893F}" type="datetime8">
               <a:rPr lang="en-US" smtClean="0"/>
-              <a:t>1/18/2025 1:19 PM</a:t>
             </a:fld>
             <a:endParaRPr lang="en-US"/>
           </a:p>
@@ -4314,7 +4206,6 @@
           <a:p>
             <a:fld id="{C4C7283F-616F-4503-ABBD-21FFB2848302}" type="slidenum">
               <a:rPr lang="en-US" smtClean="0"/>
-              <a:t>‹#›</a:t>
             </a:fld>
             <a:endParaRPr lang="en-US"/>
           </a:p>
@@ -4388,6 +4279,7 @@
               <a:rPr lang="en-US"/>
               <a:t>Click to edit Master text styles</a:t>
             </a:r>
+            <a:endParaRPr lang="en-US"/>
           </a:p>
           <a:p>
             <a:pPr lvl="1"/>
@@ -4395,6 +4287,7 @@
               <a:rPr lang="en-US"/>
               <a:t>Second level</a:t>
             </a:r>
+            <a:endParaRPr lang="en-US"/>
           </a:p>
           <a:p>
             <a:pPr lvl="2"/>
@@ -4402,6 +4295,7 @@
               <a:rPr lang="en-US"/>
               <a:t>Third level</a:t>
             </a:r>
+            <a:endParaRPr lang="en-US"/>
           </a:p>
           <a:p>
             <a:pPr lvl="3"/>
@@ -4409,6 +4303,7 @@
               <a:rPr lang="en-US"/>
               <a:t>Fourth level</a:t>
             </a:r>
+            <a:endParaRPr lang="en-US"/>
           </a:p>
           <a:p>
             <a:pPr lvl="4"/>
@@ -4437,7 +4332,6 @@
           <a:p>
             <a:fld id="{10D0E147-E127-4D87-84FF-83AF777D57B0}" type="datetime8">
               <a:rPr lang="en-US" smtClean="0"/>
-              <a:t>1/18/2025 1:19 PM</a:t>
             </a:fld>
             <a:endParaRPr lang="en-US"/>
           </a:p>
@@ -4483,7 +4377,6 @@
           <a:p>
             <a:fld id="{C4C7283F-616F-4503-ABBD-21FFB2848302}" type="slidenum">
               <a:rPr lang="en-US" smtClean="0"/>
-              <a:t>‹#›</a:t>
             </a:fld>
             <a:endParaRPr lang="en-US"/>
           </a:p>
@@ -4567,6 +4460,7 @@
               <a:rPr lang="en-US"/>
               <a:t>Click to edit Master text styles</a:t>
             </a:r>
+            <a:endParaRPr lang="en-US"/>
           </a:p>
           <a:p>
             <a:pPr lvl="1"/>
@@ -4574,6 +4468,7 @@
               <a:rPr lang="en-US"/>
               <a:t>Second level</a:t>
             </a:r>
+            <a:endParaRPr lang="en-US"/>
           </a:p>
           <a:p>
             <a:pPr lvl="2"/>
@@ -4581,6 +4476,7 @@
               <a:rPr lang="en-US"/>
               <a:t>Third level</a:t>
             </a:r>
+            <a:endParaRPr lang="en-US"/>
           </a:p>
           <a:p>
             <a:pPr lvl="3"/>
@@ -4588,6 +4484,7 @@
               <a:rPr lang="en-US"/>
               <a:t>Fourth level</a:t>
             </a:r>
+            <a:endParaRPr lang="en-US"/>
           </a:p>
           <a:p>
             <a:pPr lvl="4"/>
@@ -4616,7 +4513,6 @@
           <a:p>
             <a:fld id="{AE720A3F-507D-4EC9-B968-56BE774C5C3F}" type="datetime8">
               <a:rPr lang="en-US" smtClean="0"/>
-              <a:t>1/18/2025 1:19 PM</a:t>
             </a:fld>
             <a:endParaRPr lang="en-US"/>
           </a:p>
@@ -4662,7 +4558,6 @@
           <a:p>
             <a:fld id="{C4C7283F-616F-4503-ABBD-21FFB2848302}" type="slidenum">
               <a:rPr lang="en-US" smtClean="0"/>
-              <a:t>‹#›</a:t>
             </a:fld>
             <a:endParaRPr lang="en-US"/>
           </a:p>
@@ -4736,6 +4631,7 @@
               <a:rPr lang="en-US"/>
               <a:t>Click to edit Master text styles</a:t>
             </a:r>
+            <a:endParaRPr lang="en-US"/>
           </a:p>
           <a:p>
             <a:pPr lvl="1"/>
@@ -4743,6 +4639,7 @@
               <a:rPr lang="en-US"/>
               <a:t>Second level</a:t>
             </a:r>
+            <a:endParaRPr lang="en-US"/>
           </a:p>
           <a:p>
             <a:pPr lvl="2"/>
@@ -4750,6 +4647,7 @@
               <a:rPr lang="en-US"/>
               <a:t>Third level</a:t>
             </a:r>
+            <a:endParaRPr lang="en-US"/>
           </a:p>
           <a:p>
             <a:pPr lvl="3"/>
@@ -4757,6 +4655,7 @@
               <a:rPr lang="en-US"/>
               <a:t>Fourth level</a:t>
             </a:r>
+            <a:endParaRPr lang="en-US"/>
           </a:p>
           <a:p>
             <a:pPr lvl="4"/>
@@ -4785,7 +4684,6 @@
           <a:p>
             <a:fld id="{70EC282A-B492-45B7-A20C-B47B480682FB}" type="datetime8">
               <a:rPr lang="en-US" smtClean="0"/>
-              <a:t>1/18/2025 1:19 PM</a:t>
             </a:fld>
             <a:endParaRPr lang="en-US"/>
           </a:p>
@@ -4831,7 +4729,6 @@
           <a:p>
             <a:fld id="{C4C7283F-616F-4503-ABBD-21FFB2848302}" type="slidenum">
               <a:rPr lang="en-US" smtClean="0"/>
-              <a:t>‹#›</a:t>
             </a:fld>
             <a:endParaRPr lang="en-US"/>
           </a:p>
@@ -5011,6 +4908,7 @@
               <a:rPr lang="en-US"/>
               <a:t>Click to edit Master text styles</a:t>
             </a:r>
+            <a:endParaRPr lang="en-US"/>
           </a:p>
         </p:txBody>
       </p:sp>
@@ -5031,7 +4929,6 @@
           <a:p>
             <a:fld id="{22ED6867-56C6-420B-BF33-E2323BB11E2C}" type="datetime8">
               <a:rPr lang="en-US" smtClean="0"/>
-              <a:t>1/18/2025 1:19 PM</a:t>
             </a:fld>
             <a:endParaRPr lang="en-US"/>
           </a:p>
@@ -5077,7 +4974,6 @@
           <a:p>
             <a:fld id="{C4C7283F-616F-4503-ABBD-21FFB2848302}" type="slidenum">
               <a:rPr lang="en-US" smtClean="0"/>
-              <a:t>‹#›</a:t>
             </a:fld>
             <a:endParaRPr lang="en-US"/>
           </a:p>
@@ -5156,6 +5052,7 @@
               <a:rPr lang="en-US"/>
               <a:t>Click to edit Master text styles</a:t>
             </a:r>
+            <a:endParaRPr lang="en-US"/>
           </a:p>
           <a:p>
             <a:pPr lvl="1"/>
@@ -5163,6 +5060,7 @@
               <a:rPr lang="en-US"/>
               <a:t>Second level</a:t>
             </a:r>
+            <a:endParaRPr lang="en-US"/>
           </a:p>
           <a:p>
             <a:pPr lvl="2"/>
@@ -5170,6 +5068,7 @@
               <a:rPr lang="en-US"/>
               <a:t>Third level</a:t>
             </a:r>
+            <a:endParaRPr lang="en-US"/>
           </a:p>
           <a:p>
             <a:pPr lvl="3"/>
@@ -5177,6 +5076,7 @@
               <a:rPr lang="en-US"/>
               <a:t>Fourth level</a:t>
             </a:r>
+            <a:endParaRPr lang="en-US"/>
           </a:p>
           <a:p>
             <a:pPr lvl="4"/>
@@ -5213,6 +5113,7 @@
               <a:rPr lang="en-US"/>
               <a:t>Click to edit Master text styles</a:t>
             </a:r>
+            <a:endParaRPr lang="en-US"/>
           </a:p>
           <a:p>
             <a:pPr lvl="1"/>
@@ -5220,6 +5121,7 @@
               <a:rPr lang="en-US"/>
               <a:t>Second level</a:t>
             </a:r>
+            <a:endParaRPr lang="en-US"/>
           </a:p>
           <a:p>
             <a:pPr lvl="2"/>
@@ -5227,6 +5129,7 @@
               <a:rPr lang="en-US"/>
               <a:t>Third level</a:t>
             </a:r>
+            <a:endParaRPr lang="en-US"/>
           </a:p>
           <a:p>
             <a:pPr lvl="3"/>
@@ -5234,6 +5137,7 @@
               <a:rPr lang="en-US"/>
               <a:t>Fourth level</a:t>
             </a:r>
+            <a:endParaRPr lang="en-US"/>
           </a:p>
           <a:p>
             <a:pPr lvl="4"/>
@@ -5262,7 +5166,6 @@
           <a:p>
             <a:fld id="{A607E069-8BF9-4C5D-AE63-557D18EFCB98}" type="datetime8">
               <a:rPr lang="en-US" smtClean="0"/>
-              <a:t>1/18/2025 1:19 PM</a:t>
             </a:fld>
             <a:endParaRPr lang="en-US"/>
           </a:p>
@@ -5308,7 +5211,6 @@
           <a:p>
             <a:fld id="{C4C7283F-616F-4503-ABBD-21FFB2848302}" type="slidenum">
               <a:rPr lang="en-US" smtClean="0"/>
-              <a:t>‹#›</a:t>
             </a:fld>
             <a:endParaRPr lang="en-US"/>
           </a:p>
@@ -5430,6 +5332,7 @@
               <a:rPr lang="en-US"/>
               <a:t>Click to edit Master text styles</a:t>
             </a:r>
+            <a:endParaRPr lang="en-US"/>
           </a:p>
         </p:txBody>
       </p:sp>
@@ -5460,6 +5363,7 @@
               <a:rPr lang="en-US"/>
               <a:t>Click to edit Master text styles</a:t>
             </a:r>
+            <a:endParaRPr lang="en-US"/>
           </a:p>
           <a:p>
             <a:pPr lvl="1"/>
@@ -5467,6 +5371,7 @@
               <a:rPr lang="en-US"/>
               <a:t>Second level</a:t>
             </a:r>
+            <a:endParaRPr lang="en-US"/>
           </a:p>
           <a:p>
             <a:pPr lvl="2"/>
@@ -5474,6 +5379,7 @@
               <a:rPr lang="en-US"/>
               <a:t>Third level</a:t>
             </a:r>
+            <a:endParaRPr lang="en-US"/>
           </a:p>
           <a:p>
             <a:pPr lvl="3"/>
@@ -5481,6 +5387,7 @@
               <a:rPr lang="en-US"/>
               <a:t>Fourth level</a:t>
             </a:r>
+            <a:endParaRPr lang="en-US"/>
           </a:p>
           <a:p>
             <a:pPr lvl="4"/>
@@ -5556,6 +5463,7 @@
               <a:rPr lang="en-US"/>
               <a:t>Click to edit Master text styles</a:t>
             </a:r>
+            <a:endParaRPr lang="en-US"/>
           </a:p>
         </p:txBody>
       </p:sp>
@@ -5586,6 +5494,7 @@
               <a:rPr lang="en-US"/>
               <a:t>Click to edit Master text styles</a:t>
             </a:r>
+            <a:endParaRPr lang="en-US"/>
           </a:p>
           <a:p>
             <a:pPr lvl="1"/>
@@ -5593,6 +5502,7 @@
               <a:rPr lang="en-US"/>
               <a:t>Second level</a:t>
             </a:r>
+            <a:endParaRPr lang="en-US"/>
           </a:p>
           <a:p>
             <a:pPr lvl="2"/>
@@ -5600,6 +5510,7 @@
               <a:rPr lang="en-US"/>
               <a:t>Third level</a:t>
             </a:r>
+            <a:endParaRPr lang="en-US"/>
           </a:p>
           <a:p>
             <a:pPr lvl="3"/>
@@ -5607,6 +5518,7 @@
               <a:rPr lang="en-US"/>
               <a:t>Fourth level</a:t>
             </a:r>
+            <a:endParaRPr lang="en-US"/>
           </a:p>
           <a:p>
             <a:pPr lvl="4"/>
@@ -5635,7 +5547,6 @@
           <a:p>
             <a:fld id="{1E5FBD63-573C-4E06-9569-363F3C494C3D}" type="datetime8">
               <a:rPr lang="en-US" smtClean="0"/>
-              <a:t>1/18/2025 1:19 PM</a:t>
             </a:fld>
             <a:endParaRPr lang="en-US"/>
           </a:p>
@@ -5681,7 +5592,6 @@
           <a:p>
             <a:fld id="{C4C7283F-616F-4503-ABBD-21FFB2848302}" type="slidenum">
               <a:rPr lang="en-US" smtClean="0"/>
-              <a:t>‹#›</a:t>
             </a:fld>
             <a:endParaRPr lang="en-US"/>
           </a:p>
@@ -5757,7 +5667,6 @@
           <a:p>
             <a:fld id="{B6D13991-E6B6-4F87-BE91-DE86F2D18115}" type="datetime8">
               <a:rPr lang="en-US" smtClean="0"/>
-              <a:t>1/18/2025 1:19 PM</a:t>
             </a:fld>
             <a:endParaRPr lang="en-US"/>
           </a:p>
@@ -5803,7 +5712,6 @@
           <a:p>
             <a:fld id="{C4C7283F-616F-4503-ABBD-21FFB2848302}" type="slidenum">
               <a:rPr lang="en-US" smtClean="0"/>
-              <a:t>‹#›</a:t>
             </a:fld>
             <a:endParaRPr lang="en-US"/>
           </a:p>
@@ -5851,7 +5759,6 @@
           <a:p>
             <a:fld id="{E8E64E3B-1E9C-45AC-B5D2-2EB786A4C096}" type="datetime8">
               <a:rPr lang="en-US" smtClean="0"/>
-              <a:t>1/18/2025 1:19 PM</a:t>
             </a:fld>
             <a:endParaRPr lang="en-US"/>
           </a:p>
@@ -5897,7 +5804,6 @@
           <a:p>
             <a:fld id="{C4C7283F-616F-4503-ABBD-21FFB2848302}" type="slidenum">
               <a:rPr lang="en-US" smtClean="0"/>
-              <a:t>‹#›</a:t>
             </a:fld>
             <a:endParaRPr lang="en-US"/>
           </a:p>
@@ -5989,6 +5895,7 @@
               <a:rPr lang="en-US"/>
               <a:t>Click to edit Master text styles</a:t>
             </a:r>
+            <a:endParaRPr lang="en-US"/>
           </a:p>
           <a:p>
             <a:pPr lvl="1"/>
@@ -5996,6 +5903,7 @@
               <a:rPr lang="en-US"/>
               <a:t>Second level</a:t>
             </a:r>
+            <a:endParaRPr lang="en-US"/>
           </a:p>
           <a:p>
             <a:pPr lvl="2"/>
@@ -6003,6 +5911,7 @@
               <a:rPr lang="en-US"/>
               <a:t>Third level</a:t>
             </a:r>
+            <a:endParaRPr lang="en-US"/>
           </a:p>
           <a:p>
             <a:pPr lvl="3"/>
@@ -6010,6 +5919,7 @@
               <a:rPr lang="en-US"/>
               <a:t>Fourth level</a:t>
             </a:r>
+            <a:endParaRPr lang="en-US"/>
           </a:p>
           <a:p>
             <a:pPr lvl="4"/>
@@ -6085,6 +5995,7 @@
               <a:rPr lang="en-US"/>
               <a:t>Click to edit Master text styles</a:t>
             </a:r>
+            <a:endParaRPr lang="en-US"/>
           </a:p>
         </p:txBody>
       </p:sp>
@@ -6105,7 +6016,6 @@
           <a:p>
             <a:fld id="{ECA93773-089F-4535-A246-EBAAB41DAF3A}" type="datetime8">
               <a:rPr lang="en-US" smtClean="0"/>
-              <a:t>1/18/2025 1:19 PM</a:t>
             </a:fld>
             <a:endParaRPr lang="en-US"/>
           </a:p>
@@ -6151,7 +6061,6 @@
           <a:p>
             <a:fld id="{C4C7283F-616F-4503-ABBD-21FFB2848302}" type="slidenum">
               <a:rPr lang="en-US" smtClean="0"/>
-              <a:t>‹#›</a:t>
             </a:fld>
             <a:endParaRPr lang="en-US"/>
           </a:p>
@@ -6347,6 +6256,7 @@
               <a:rPr lang="en-US"/>
               <a:t>Click to edit Master text styles</a:t>
             </a:r>
+            <a:endParaRPr lang="en-US"/>
           </a:p>
         </p:txBody>
       </p:sp>
@@ -6390,7 +6300,6 @@
           <a:p>
             <a:fld id="{C4C7283F-616F-4503-ABBD-21FFB2848302}" type="slidenum">
               <a:rPr lang="en-US" smtClean="0"/>
-              <a:t>‹#›</a:t>
             </a:fld>
             <a:endParaRPr lang="en-US"/>
           </a:p>
@@ -6413,7 +6322,6 @@
           <a:p>
             <a:fld id="{509537D5-94C9-4CB2-9673-B6F009DE731B}" type="datetime8">
               <a:rPr lang="en-US" smtClean="0"/>
-              <a:t>1/18/2025 1:19 PM</a:t>
             </a:fld>
             <a:endParaRPr lang="en-US"/>
           </a:p>
@@ -7043,6 +6951,7 @@
               <a:rPr lang="en-US"/>
               <a:t>Click to edit Master text styles</a:t>
             </a:r>
+            <a:endParaRPr lang="en-US"/>
           </a:p>
           <a:p>
             <a:pPr lvl="1"/>
@@ -7050,6 +6959,7 @@
               <a:rPr lang="en-US"/>
               <a:t>Second level</a:t>
             </a:r>
+            <a:endParaRPr lang="en-US"/>
           </a:p>
           <a:p>
             <a:pPr lvl="2"/>
@@ -7057,6 +6967,7 @@
               <a:rPr lang="en-US"/>
               <a:t>Third level</a:t>
             </a:r>
+            <a:endParaRPr lang="en-US"/>
           </a:p>
           <a:p>
             <a:pPr lvl="3"/>
@@ -7064,6 +6975,7 @@
               <a:rPr lang="en-US"/>
               <a:t>Fourth level</a:t>
             </a:r>
+            <a:endParaRPr lang="en-US"/>
           </a:p>
           <a:p>
             <a:pPr lvl="4"/>
@@ -7110,7 +7022,6 @@
           <a:p>
             <a:fld id="{69D0E751-3CC6-4AC8-BFD8-B111550C4052}" type="datetime8">
               <a:rPr lang="en-US" smtClean="0"/>
-              <a:t>1/18/2025 1:19 PM</a:t>
             </a:fld>
             <a:endParaRPr lang="en-US"/>
           </a:p>
@@ -7190,7 +7101,6 @@
           <a:p>
             <a:fld id="{C4C7283F-616F-4503-ABBD-21FFB2848302}" type="slidenum">
               <a:rPr lang="en-US" smtClean="0"/>
-              <a:t>‹#›</a:t>
             </a:fld>
             <a:endParaRPr lang="en-US"/>
           </a:p>
@@ -7659,6 +7569,7 @@
               <a:rPr lang="en-US" sz="6000" b="1" dirty="0"/>
               <a:t>Movie Industry Analysis</a:t>
             </a:r>
+            <a:endParaRPr lang="en-US" sz="6000" b="1" dirty="0"/>
           </a:p>
         </p:txBody>
       </p:sp>
@@ -7688,6 +7599,7 @@
               <a:rPr lang="en-US" sz="4800" i="1" dirty="0"/>
               <a:t>GROUP 1 PHASE 2 PROJECT</a:t>
             </a:r>
+            <a:endParaRPr lang="en-US" sz="4800" i="1" dirty="0"/>
           </a:p>
         </p:txBody>
       </p:sp>
@@ -7731,7 +7643,6 @@
           <a:p>
             <a:fld id="{C4C7283F-616F-4503-ABBD-21FFB2848302}" type="slidenum">
               <a:rPr lang="en-US" smtClean="0"/>
-              <a:t>1</a:t>
             </a:fld>
             <a:endParaRPr lang="en-US"/>
           </a:p>
@@ -7787,6 +7698,7 @@
               <a:rPr lang="en-US" dirty="0"/>
               <a:t>METHODOLOGY</a:t>
             </a:r>
+            <a:endParaRPr lang="en-US" dirty="0"/>
           </a:p>
         </p:txBody>
       </p:sp>
@@ -7830,7 +7742,6 @@
           <a:p>
             <a:fld id="{C4C7283F-616F-4503-ABBD-21FFB2848302}" type="slidenum">
               <a:rPr lang="en-US" smtClean="0"/>
-              <a:t>10</a:t>
             </a:fld>
             <a:endParaRPr lang="en-US"/>
           </a:p>
@@ -7838,13 +7749,7 @@
       </p:sp>
       <p:sp>
         <p:nvSpPr>
-          <p:cNvPr id="6" name="Rectangle 5">
-            <a:extLst>
-              <a:ext uri="{FF2B5EF4-FFF2-40B4-BE49-F238E27FC236}">
-                <a16:creationId xmlns:a16="http://schemas.microsoft.com/office/drawing/2014/main" id="{6B4B7EDB-5BE2-0D2E-40F1-42711DBACD06}"/>
-              </a:ext>
-            </a:extLst>
-          </p:cNvPr>
+          <p:cNvPr id="6" name="Rectangle 5"/>
           <p:cNvSpPr/>
           <p:nvPr/>
         </p:nvSpPr>
@@ -7857,7 +7762,7 @@
             <a:avLst/>
           </a:prstGeom>
           <a:blipFill>
-            <a:blip r:embed="rId2"/>
+            <a:blip r:embed="rId1"/>
             <a:stretch>
               <a:fillRect/>
             </a:stretch>
@@ -7884,7 +7789,7 @@
           <a:lstStyle/>
           <a:p>
             <a:pPr algn="ctr"/>
-            <a:endParaRPr lang="en-KE" dirty="0"/>
+            <a:endParaRPr lang="en-US" dirty="0"/>
           </a:p>
         </p:txBody>
       </p:sp>
@@ -7940,6 +7845,9 @@
               </a:rPr>
               <a:t>Comparison between genre and rating</a:t>
             </a:r>
+            <a:endParaRPr lang="en-US" sz="4400" dirty="0">
+              <a:latin typeface="+mn-lt"/>
+            </a:endParaRPr>
           </a:p>
         </p:txBody>
       </p:sp>
@@ -7968,6 +7876,7 @@
               <a:rPr lang="en-US" sz="2400" dirty="0"/>
               <a:t>The highly rated genre is drama.</a:t>
             </a:r>
+            <a:endParaRPr lang="en-US" sz="2400" dirty="0"/>
           </a:p>
           <a:p>
             <a:pPr algn="l"/>
@@ -8015,7 +7924,6 @@
           <a:p>
             <a:fld id="{C4C7283F-616F-4503-ABBD-21FFB2848302}" type="slidenum">
               <a:rPr lang="en-US" smtClean="0"/>
-              <a:t>11</a:t>
             </a:fld>
             <a:endParaRPr lang="en-US"/>
           </a:p>
@@ -8023,13 +7931,7 @@
       </p:sp>
       <p:sp>
         <p:nvSpPr>
-          <p:cNvPr id="7" name="Rectangle 6">
-            <a:extLst>
-              <a:ext uri="{FF2B5EF4-FFF2-40B4-BE49-F238E27FC236}">
-                <a16:creationId xmlns:a16="http://schemas.microsoft.com/office/drawing/2014/main" id="{7A9840DF-A309-B090-8469-8B85A8CFCCBA}"/>
-              </a:ext>
-            </a:extLst>
-          </p:cNvPr>
+          <p:cNvPr id="7" name="Rectangle 6"/>
           <p:cNvSpPr/>
           <p:nvPr/>
         </p:nvSpPr>
@@ -8042,7 +7944,7 @@
             <a:avLst/>
           </a:prstGeom>
           <a:blipFill>
-            <a:blip r:embed="rId3"/>
+            <a:blip r:embed="rId1"/>
             <a:stretch>
               <a:fillRect/>
             </a:stretch>
@@ -8072,7 +7974,7 @@
           <a:lstStyle/>
           <a:p>
             <a:pPr algn="ctr"/>
-            <a:endParaRPr lang="en-KE"/>
+            <a:endParaRPr lang="en-US"/>
           </a:p>
         </p:txBody>
       </p:sp>
@@ -8089,13 +7991,7 @@
   <p:cSld>
     <p:spTree>
       <p:nvGrpSpPr>
-        <p:cNvPr id="1" name="">
-          <a:extLst>
-            <a:ext uri="{FF2B5EF4-FFF2-40B4-BE49-F238E27FC236}">
-              <a16:creationId xmlns:a16="http://schemas.microsoft.com/office/drawing/2014/main" id="{53F3754E-7C0F-585B-A755-120D502FAD9C}"/>
-            </a:ext>
-          </a:extLst>
-        </p:cNvPr>
+        <p:cNvPr id="1" name=""/>
         <p:cNvGrpSpPr/>
         <p:nvPr/>
       </p:nvGrpSpPr>
@@ -8109,13 +8005,7 @@
       </p:grpSpPr>
       <p:sp>
         <p:nvSpPr>
-          <p:cNvPr id="2" name="Title 1">
-            <a:extLst>
-              <a:ext uri="{FF2B5EF4-FFF2-40B4-BE49-F238E27FC236}">
-                <a16:creationId xmlns:a16="http://schemas.microsoft.com/office/drawing/2014/main" id="{67AB1856-9EF6-2FF9-D528-56FB29A1F04E}"/>
-              </a:ext>
-            </a:extLst>
-          </p:cNvPr>
+          <p:cNvPr id="2" name="Title 1"/>
           <p:cNvSpPr>
             <a:spLocks noGrp="1"/>
           </p:cNvSpPr>
@@ -8140,18 +8030,15 @@
               </a:rPr>
               <a:t>Comparison between genre and sales</a:t>
             </a:r>
-          </a:p>
-        </p:txBody>
-      </p:sp>
-      <p:sp>
-        <p:nvSpPr>
-          <p:cNvPr id="3" name="Subtitle 2">
-            <a:extLst>
-              <a:ext uri="{FF2B5EF4-FFF2-40B4-BE49-F238E27FC236}">
-                <a16:creationId xmlns:a16="http://schemas.microsoft.com/office/drawing/2014/main" id="{218F712E-AA46-17E1-6F58-EE61E6B52FE1}"/>
-              </a:ext>
-            </a:extLst>
-          </p:cNvPr>
+            <a:endParaRPr lang="en-US" sz="4400" dirty="0">
+              <a:latin typeface="+mn-lt"/>
+            </a:endParaRPr>
+          </a:p>
+        </p:txBody>
+      </p:sp>
+      <p:sp>
+        <p:nvSpPr>
+          <p:cNvPr id="3" name="Subtitle 2"/>
           <p:cNvSpPr>
             <a:spLocks noGrp="1"/>
           </p:cNvSpPr>
@@ -8176,18 +8063,13 @@
               <a:rPr lang="en-US" sz="2400" dirty="0"/>
               <a:t>Highest sales were from comedy, followed by drama.</a:t>
             </a:r>
-          </a:p>
-        </p:txBody>
-      </p:sp>
-      <p:sp>
-        <p:nvSpPr>
-          <p:cNvPr id="4" name="Footer Placeholder 3">
-            <a:extLst>
-              <a:ext uri="{FF2B5EF4-FFF2-40B4-BE49-F238E27FC236}">
-                <a16:creationId xmlns:a16="http://schemas.microsoft.com/office/drawing/2014/main" id="{DA30E88E-A9DA-DE55-9CA0-A17AD8C81538}"/>
-              </a:ext>
-            </a:extLst>
-          </p:cNvPr>
+            <a:endParaRPr lang="en-US" sz="2400" dirty="0"/>
+          </a:p>
+        </p:txBody>
+      </p:sp>
+      <p:sp>
+        <p:nvSpPr>
+          <p:cNvPr id="4" name="Footer Placeholder 3"/>
           <p:cNvSpPr>
             <a:spLocks noGrp="1"/>
           </p:cNvSpPr>
@@ -8210,13 +8092,7 @@
       </p:sp>
       <p:sp>
         <p:nvSpPr>
-          <p:cNvPr id="6" name="Slide Number Placeholder 5">
-            <a:extLst>
-              <a:ext uri="{FF2B5EF4-FFF2-40B4-BE49-F238E27FC236}">
-                <a16:creationId xmlns:a16="http://schemas.microsoft.com/office/drawing/2014/main" id="{463BB677-2E22-9987-822D-7541D8BE6D3E}"/>
-              </a:ext>
-            </a:extLst>
-          </p:cNvPr>
+          <p:cNvPr id="6" name="Slide Number Placeholder 5"/>
           <p:cNvSpPr>
             <a:spLocks noGrp="1"/>
           </p:cNvSpPr>
@@ -8231,7 +8107,6 @@
           <a:p>
             <a:fld id="{C4C7283F-616F-4503-ABBD-21FFB2848302}" type="slidenum">
               <a:rPr lang="en-US" smtClean="0"/>
-              <a:t>12</a:t>
             </a:fld>
             <a:endParaRPr lang="en-US"/>
           </a:p>
@@ -8239,13 +8114,7 @@
       </p:sp>
       <p:sp>
         <p:nvSpPr>
-          <p:cNvPr id="7" name="Rectangle 6">
-            <a:extLst>
-              <a:ext uri="{FF2B5EF4-FFF2-40B4-BE49-F238E27FC236}">
-                <a16:creationId xmlns:a16="http://schemas.microsoft.com/office/drawing/2014/main" id="{DE71FDC5-3C4F-1DF9-1DE5-0375023E6394}"/>
-              </a:ext>
-            </a:extLst>
-          </p:cNvPr>
+          <p:cNvPr id="7" name="Rectangle 6"/>
           <p:cNvSpPr/>
           <p:nvPr/>
         </p:nvSpPr>
@@ -8258,7 +8127,7 @@
             <a:avLst/>
           </a:prstGeom>
           <a:blipFill>
-            <a:blip r:embed="rId3"/>
+            <a:blip r:embed="rId1"/>
             <a:stretch>
               <a:fillRect/>
             </a:stretch>
@@ -8288,16 +8157,11 @@
           <a:lstStyle/>
           <a:p>
             <a:pPr algn="ctr"/>
-            <a:endParaRPr lang="en-KE" dirty="0"/>
+            <a:endParaRPr lang="en-US" dirty="0"/>
           </a:p>
         </p:txBody>
       </p:sp>
     </p:spTree>
-    <p:extLst>
-      <p:ext uri="{BB962C8B-B14F-4D97-AF65-F5344CB8AC3E}">
-        <p14:creationId xmlns:p14="http://schemas.microsoft.com/office/powerpoint/2010/main" val="4119880214"/>
-      </p:ext>
-    </p:extLst>
   </p:cSld>
   <p:clrMapOvr>
     <a:masterClrMapping/>
@@ -8349,6 +8213,7 @@
               <a:rPr lang="en-US" sz="2000" dirty="0"/>
               <a:t>Movies and films from Jay roach made highest sales followed by Mel Gibson and Sam Mendes.</a:t>
             </a:r>
+            <a:endParaRPr lang="en-US" sz="2000" dirty="0"/>
           </a:p>
         </p:txBody>
       </p:sp>
@@ -8392,7 +8257,6 @@
           <a:p>
             <a:fld id="{C4C7283F-616F-4503-ABBD-21FFB2848302}" type="slidenum">
               <a:rPr lang="en-US" smtClean="0"/>
-              <a:t>13</a:t>
             </a:fld>
             <a:endParaRPr lang="en-US"/>
           </a:p>
@@ -8400,16 +8264,8 @@
       </p:sp>
       <p:sp>
         <p:nvSpPr>
-          <p:cNvPr id="7" name="Title 1">
-            <a:extLst>
-              <a:ext uri="{FF2B5EF4-FFF2-40B4-BE49-F238E27FC236}">
-                <a16:creationId xmlns:a16="http://schemas.microsoft.com/office/drawing/2014/main" id="{0212021C-579C-6952-049C-DC3A5A74B0AF}"/>
-              </a:ext>
-            </a:extLst>
-          </p:cNvPr>
-          <p:cNvSpPr txBox="1">
-            <a:spLocks/>
-          </p:cNvSpPr>
+          <p:cNvPr id="7" name="Title 1"/>
+          <p:cNvSpPr txBox="1"/>
           <p:nvPr/>
         </p:nvSpPr>
         <p:spPr>
@@ -8505,25 +8361,22 @@
               </a:rPr>
               <a:t>Comparison between directors and sales</a:t>
             </a:r>
+            <a:endParaRPr lang="en-US" sz="4400" dirty="0">
+              <a:latin typeface="+mn-lt"/>
+            </a:endParaRPr>
           </a:p>
         </p:txBody>
       </p:sp>
       <p:pic>
         <p:nvPicPr>
-          <p:cNvPr id="13" name="Picture 12">
-            <a:extLst>
-              <a:ext uri="{FF2B5EF4-FFF2-40B4-BE49-F238E27FC236}">
-                <a16:creationId xmlns:a16="http://schemas.microsoft.com/office/drawing/2014/main" id="{D12ED098-D414-95E1-19CF-D4B4A01A1992}"/>
-              </a:ext>
-            </a:extLst>
-          </p:cNvPr>
+          <p:cNvPr id="13" name="Picture 12"/>
           <p:cNvPicPr>
             <a:picLocks noChangeAspect="1"/>
           </p:cNvPicPr>
           <p:nvPr/>
         </p:nvPicPr>
         <p:blipFill>
-          <a:blip r:embed="rId3"/>
+          <a:blip r:embed="rId1"/>
           <a:stretch>
             <a:fillRect/>
           </a:stretch>
@@ -8590,6 +8443,7 @@
               <a:rPr lang="en-US" sz="2000" dirty="0"/>
               <a:t>Dramas from Anna were the most popular as well as crime, drama, thriller from Eden Movies.</a:t>
             </a:r>
+            <a:endParaRPr lang="en-US" sz="2000" dirty="0"/>
           </a:p>
         </p:txBody>
       </p:sp>
@@ -8633,7 +8487,6 @@
           <a:p>
             <a:fld id="{C4C7283F-616F-4503-ABBD-21FFB2848302}" type="slidenum">
               <a:rPr lang="en-US" smtClean="0"/>
-              <a:t>14</a:t>
             </a:fld>
             <a:endParaRPr lang="en-US"/>
           </a:p>
@@ -8648,7 +8501,7 @@
           <p:nvPr/>
         </p:nvPicPr>
         <p:blipFill>
-          <a:blip r:embed="rId3">
+          <a:blip r:embed="rId1">
             <a:extLst>
               <a:ext uri="{28A0092B-C50C-407E-A947-70E740481C1C}">
                 <a14:useLocalDpi xmlns:a14="http://schemas.microsoft.com/office/drawing/2010/main" val="0"/>
@@ -8656,7 +8509,9 @@
             </a:extLst>
           </a:blip>
           <a:srcRect/>
-          <a:stretch/>
+          <a:stretch>
+            <a:fillRect/>
+          </a:stretch>
         </p:blipFill>
         <p:spPr>
           <a:xfrm>
@@ -8673,16 +8528,8 @@
       </p:pic>
       <p:sp>
         <p:nvSpPr>
-          <p:cNvPr id="9" name="Title 1">
-            <a:extLst>
-              <a:ext uri="{FF2B5EF4-FFF2-40B4-BE49-F238E27FC236}">
-                <a16:creationId xmlns:a16="http://schemas.microsoft.com/office/drawing/2014/main" id="{DAB27D95-4F06-45FD-D5E2-778DE3C72267}"/>
-              </a:ext>
-            </a:extLst>
-          </p:cNvPr>
-          <p:cNvSpPr txBox="1">
-            <a:spLocks/>
-          </p:cNvSpPr>
+          <p:cNvPr id="9" name="Title 1"/>
+          <p:cNvSpPr txBox="1"/>
           <p:nvPr/>
         </p:nvSpPr>
         <p:spPr>
@@ -8778,6 +8625,9 @@
               </a:rPr>
               <a:t>Top 3 movies with top 3 genres and popularity</a:t>
             </a:r>
+            <a:endParaRPr lang="en-US" sz="4400" dirty="0">
+              <a:latin typeface="+mn-lt"/>
+            </a:endParaRPr>
           </a:p>
         </p:txBody>
       </p:sp>
@@ -8832,6 +8682,7 @@
               <a:rPr lang="en-US" sz="2000" dirty="0"/>
               <a:t>Drama was the most popular genre doubling the other categories.</a:t>
             </a:r>
+            <a:endParaRPr lang="en-US" sz="2000" dirty="0"/>
           </a:p>
         </p:txBody>
       </p:sp>
@@ -8875,7 +8726,6 @@
           <a:p>
             <a:fld id="{C4C7283F-616F-4503-ABBD-21FFB2848302}" type="slidenum">
               <a:rPr lang="en-US" smtClean="0"/>
-              <a:t>15</a:t>
             </a:fld>
             <a:endParaRPr lang="en-US"/>
           </a:p>
@@ -8883,20 +8733,14 @@
       </p:sp>
       <p:pic>
         <p:nvPicPr>
-          <p:cNvPr id="8" name="Picture 7">
-            <a:extLst>
-              <a:ext uri="{FF2B5EF4-FFF2-40B4-BE49-F238E27FC236}">
-                <a16:creationId xmlns:a16="http://schemas.microsoft.com/office/drawing/2014/main" id="{D3886ADF-0BE8-2723-8374-876951300211}"/>
-              </a:ext>
-            </a:extLst>
-          </p:cNvPr>
+          <p:cNvPr id="8" name="Picture 7"/>
           <p:cNvPicPr>
             <a:picLocks noChangeAspect="1"/>
           </p:cNvPicPr>
           <p:nvPr/>
         </p:nvPicPr>
         <p:blipFill>
-          <a:blip r:embed="rId3"/>
+          <a:blip r:embed="rId1"/>
           <a:stretch>
             <a:fillRect/>
           </a:stretch>
@@ -8913,13 +8757,7 @@
       </p:pic>
       <p:sp>
         <p:nvSpPr>
-          <p:cNvPr id="10" name="Title 9">
-            <a:extLst>
-              <a:ext uri="{FF2B5EF4-FFF2-40B4-BE49-F238E27FC236}">
-                <a16:creationId xmlns:a16="http://schemas.microsoft.com/office/drawing/2014/main" id="{812ED197-C011-5F09-F52C-BC0B31DE5780}"/>
-              </a:ext>
-            </a:extLst>
-          </p:cNvPr>
+          <p:cNvPr id="10" name="Title 9"/>
           <p:cNvSpPr>
             <a:spLocks noGrp="1"/>
           </p:cNvSpPr>
@@ -8941,7 +8779,7 @@
               <a:rPr lang="en-GB" dirty="0"/>
               <a:t>Top 5 popular genres</a:t>
             </a:r>
-            <a:endParaRPr lang="en-KE" dirty="0"/>
+            <a:endParaRPr lang="en-US" dirty="0"/>
           </a:p>
         </p:txBody>
       </p:sp>
@@ -8996,6 +8834,7 @@
               <a:rPr lang="en-US" b="1" dirty="0"/>
               <a:t>Comparison between genre and production budget</a:t>
             </a:r>
+            <a:endParaRPr lang="en-US" b="1" dirty="0"/>
           </a:p>
         </p:txBody>
       </p:sp>
@@ -9025,6 +8864,7 @@
               <a:rPr lang="en-US" dirty="0"/>
               <a:t>Comedy ,drama  were costly in budget but gave the highest returns on investment.</a:t>
             </a:r>
+            <a:endParaRPr lang="en-US" dirty="0"/>
           </a:p>
         </p:txBody>
       </p:sp>
@@ -9068,7 +8908,6 @@
           <a:p>
             <a:fld id="{C4C7283F-616F-4503-ABBD-21FFB2848302}" type="slidenum">
               <a:rPr lang="en-US" smtClean="0"/>
-              <a:t>16</a:t>
             </a:fld>
             <a:endParaRPr lang="en-US"/>
           </a:p>
@@ -9083,7 +8922,7 @@
           <p:nvPr/>
         </p:nvPicPr>
         <p:blipFill>
-          <a:blip r:embed="rId3">
+          <a:blip r:embed="rId1">
             <a:extLst>
               <a:ext uri="{28A0092B-C50C-407E-A947-70E740481C1C}">
                 <a14:useLocalDpi xmlns:a14="http://schemas.microsoft.com/office/drawing/2010/main" val="0"/>
@@ -9091,7 +8930,9 @@
             </a:extLst>
           </a:blip>
           <a:srcRect/>
-          <a:stretch/>
+          <a:stretch>
+            <a:fillRect/>
+          </a:stretch>
         </p:blipFill>
         <p:spPr>
           <a:xfrm>
@@ -9153,6 +8994,7 @@
               <a:rPr lang="en-US" dirty="0"/>
               <a:t>Top 5 most popular movie rating</a:t>
             </a:r>
+            <a:endParaRPr lang="en-US" dirty="0"/>
           </a:p>
         </p:txBody>
       </p:sp>
@@ -9183,6 +9025,7 @@
               <a:rPr lang="en-US" sz="2400" dirty="0"/>
               <a:t>R,PG-13,PG IN Descending order of popularity.</a:t>
             </a:r>
+            <a:endParaRPr lang="en-US" sz="2400" dirty="0"/>
           </a:p>
         </p:txBody>
       </p:sp>
@@ -9226,7 +9069,6 @@
           <a:p>
             <a:fld id="{C4C7283F-616F-4503-ABBD-21FFB2848302}" type="slidenum">
               <a:rPr lang="en-US" smtClean="0"/>
-              <a:t>17</a:t>
             </a:fld>
             <a:endParaRPr lang="en-US"/>
           </a:p>
@@ -9241,7 +9083,7 @@
           <p:nvPr/>
         </p:nvPicPr>
         <p:blipFill>
-          <a:blip r:embed="rId3">
+          <a:blip r:embed="rId1">
             <a:extLst>
               <a:ext uri="{28A0092B-C50C-407E-A947-70E740481C1C}">
                 <a14:useLocalDpi xmlns:a14="http://schemas.microsoft.com/office/drawing/2010/main" val="0"/>
@@ -9249,7 +9091,9 @@
             </a:extLst>
           </a:blip>
           <a:srcRect/>
-          <a:stretch/>
+          <a:stretch>
+            <a:fillRect/>
+          </a:stretch>
         </p:blipFill>
         <p:spPr>
           <a:xfrm>
@@ -9310,6 +9154,7 @@
               <a:rPr lang="en-US" dirty="0"/>
               <a:t>Yearly release timing analysis</a:t>
             </a:r>
+            <a:endParaRPr lang="en-US" dirty="0"/>
           </a:p>
         </p:txBody>
       </p:sp>
@@ -9340,6 +9185,7 @@
               <a:rPr lang="en-US" sz="2400" dirty="0"/>
               <a:t>Time series showed an upward trend in terms of Rating worth investing.</a:t>
             </a:r>
+            <a:endParaRPr lang="en-US" sz="2400" dirty="0"/>
           </a:p>
         </p:txBody>
       </p:sp>
@@ -9383,7 +9229,6 @@
           <a:p>
             <a:fld id="{C4C7283F-616F-4503-ABBD-21FFB2848302}" type="slidenum">
               <a:rPr lang="en-US" smtClean="0"/>
-              <a:t>18</a:t>
             </a:fld>
             <a:endParaRPr lang="en-US"/>
           </a:p>
@@ -9398,7 +9243,7 @@
           <p:nvPr/>
         </p:nvPicPr>
         <p:blipFill>
-          <a:blip r:embed="rId3">
+          <a:blip r:embed="rId1">
             <a:extLst>
               <a:ext uri="{28A0092B-C50C-407E-A947-70E740481C1C}">
                 <a14:useLocalDpi xmlns:a14="http://schemas.microsoft.com/office/drawing/2010/main" val="0"/>
@@ -9406,7 +9251,9 @@
             </a:extLst>
           </a:blip>
           <a:srcRect/>
-          <a:stretch/>
+          <a:stretch>
+            <a:fillRect/>
+          </a:stretch>
         </p:blipFill>
         <p:spPr>
           <a:xfrm>
@@ -9468,6 +9315,7 @@
               <a:rPr lang="en-US" sz="4800" dirty="0"/>
               <a:t>Comparison between genres and total gross</a:t>
             </a:r>
+            <a:endParaRPr lang="en-US" sz="4800" dirty="0"/>
           </a:p>
         </p:txBody>
       </p:sp>
@@ -9498,6 +9346,7 @@
               <a:rPr lang="en-US" sz="2000" dirty="0"/>
               <a:t>Drama, action and adventure, comedy showed an increasing trend in terms of gross profits.</a:t>
             </a:r>
+            <a:endParaRPr lang="en-US" sz="2000" dirty="0"/>
           </a:p>
         </p:txBody>
       </p:sp>
@@ -9541,7 +9390,6 @@
           <a:p>
             <a:fld id="{C4C7283F-616F-4503-ABBD-21FFB2848302}" type="slidenum">
               <a:rPr lang="en-US" smtClean="0"/>
-              <a:t>19</a:t>
             </a:fld>
             <a:endParaRPr lang="en-US"/>
           </a:p>
@@ -9556,7 +9404,7 @@
           <p:nvPr/>
         </p:nvPicPr>
         <p:blipFill>
-          <a:blip r:embed="rId3">
+          <a:blip r:embed="rId1">
             <a:extLst>
               <a:ext uri="{28A0092B-C50C-407E-A947-70E740481C1C}">
                 <a14:useLocalDpi xmlns:a14="http://schemas.microsoft.com/office/drawing/2010/main" val="0"/>
@@ -9564,7 +9412,9 @@
             </a:extLst>
           </a:blip>
           <a:srcRect/>
-          <a:stretch/>
+          <a:stretch>
+            <a:fillRect/>
+          </a:stretch>
         </p:blipFill>
         <p:spPr>
           <a:xfrm>
@@ -9628,6 +9478,7 @@
               <a:rPr lang="en-US" b="1" dirty="0"/>
               <a:t>OVERVIEW OF THE PROJECT</a:t>
             </a:r>
+            <a:endParaRPr lang="en-US" b="1" dirty="0"/>
           </a:p>
         </p:txBody>
       </p:sp>
@@ -9661,6 +9512,7 @@
               <a:rPr lang="en-GB" sz="2400" dirty="0"/>
               <a:t>The project focuses on analysing movie datasets to provide actionable    insights for the creation of a new movie studio. </a:t>
             </a:r>
+            <a:endParaRPr lang="en-GB" sz="2400" dirty="0"/>
           </a:p>
           <a:p>
             <a:pPr algn="l">
@@ -9671,6 +9523,7 @@
               <a:rPr lang="en-GB" sz="2400" dirty="0"/>
               <a:t>Using data visualization and analysis tools, such as Tableau and models</a:t>
             </a:r>
+            <a:endParaRPr lang="en-GB" sz="2400" dirty="0"/>
           </a:p>
           <a:p>
             <a:pPr algn="l">
@@ -9732,7 +9585,6 @@
           <a:p>
             <a:fld id="{C4C7283F-616F-4503-ABBD-21FFB2848302}" type="slidenum">
               <a:rPr lang="en-US" smtClean="0"/>
-              <a:t>2</a:t>
             </a:fld>
             <a:endParaRPr lang="en-US"/>
           </a:p>
@@ -9789,6 +9641,7 @@
               <a:rPr lang="en-US" dirty="0"/>
               <a:t>				RESULTS/FINDINGS</a:t>
             </a:r>
+            <a:endParaRPr lang="en-US" dirty="0"/>
           </a:p>
         </p:txBody>
       </p:sp>
@@ -9822,6 +9675,7 @@
               <a:rPr lang="en-US" sz="8000" dirty="0"/>
               <a:t>ROI Leaders: Action and Adventure genres lead in return on investment (ROI), making them highly profitable.</a:t>
             </a:r>
+            <a:endParaRPr lang="en-US" sz="8000" dirty="0"/>
           </a:p>
           <a:p>
             <a:pPr lvl="0">
@@ -9832,6 +9686,7 @@
               <a:rPr lang="en-US" sz="8000" dirty="0"/>
               <a:t>Budget Allocation: Production budgets are highest for Comedy and Drama, reflecting their revenue potential.</a:t>
             </a:r>
+            <a:endParaRPr lang="en-US" sz="8000" dirty="0"/>
           </a:p>
           <a:p>
             <a:pPr lvl="0">
@@ -9842,6 +9697,7 @@
               <a:rPr lang="en-US" sz="8000" dirty="0"/>
               <a:t>Studio Performance: Universal Pictures has the highest average ratings, showcasing its strong audience appeal.</a:t>
             </a:r>
+            <a:endParaRPr lang="en-US" sz="8000" dirty="0"/>
           </a:p>
           <a:p>
             <a:pPr lvl="0">
@@ -9852,6 +9708,7 @@
               <a:rPr lang="en-US" sz="8000" dirty="0"/>
               <a:t>Release Timing: Average ratings peaked in recent years, suggesting growing audience satisfaction with newer movies. ROI Leaders: Action and Adventure genres lead in return on investment (ROI), making them highly profitable.</a:t>
             </a:r>
+            <a:endParaRPr lang="en-US" sz="8000" dirty="0"/>
           </a:p>
           <a:p>
             <a:pPr lvl="0">
@@ -9862,6 +9719,7 @@
               <a:rPr lang="en-US" sz="8000" dirty="0"/>
               <a:t>Budget Allocation: Production budgets are highest for Comedy and Drama, reflecting their revenue potential.</a:t>
             </a:r>
+            <a:endParaRPr lang="en-US" sz="8000" dirty="0"/>
           </a:p>
           <a:p>
             <a:pPr lvl="0">
@@ -9872,6 +9730,7 @@
               <a:rPr lang="en-US" sz="8000" dirty="0"/>
               <a:t>Studio Performance: Universal Pictures has the highest average ratings, showcasing its strong audience appeal.</a:t>
             </a:r>
+            <a:endParaRPr lang="en-US" sz="8000" dirty="0"/>
           </a:p>
           <a:p>
             <a:pPr lvl="0">
@@ -9882,6 +9741,7 @@
               <a:rPr lang="en-US" sz="8000" dirty="0"/>
               <a:t>Release Timing: Average ratings peaked in recent years, suggesting growing audience satisfaction with newer movies.</a:t>
             </a:r>
+            <a:endParaRPr lang="en-US" sz="8000" dirty="0"/>
           </a:p>
           <a:p>
             <a:pPr>
@@ -9949,7 +9809,6 @@
           <a:p>
             <a:fld id="{C4C7283F-616F-4503-ABBD-21FFB2848302}" type="slidenum">
               <a:rPr lang="en-US" smtClean="0"/>
-              <a:t>20</a:t>
             </a:fld>
             <a:endParaRPr lang="en-US"/>
           </a:p>
@@ -10029,6 +9888,7 @@
               <a:rPr lang="en-US" sz="2000" dirty="0"/>
               <a:t>We would like to acknowledge all the group one members for working tirelessly to contribute to this project:</a:t>
             </a:r>
+            <a:endParaRPr lang="en-US" sz="2000" dirty="0"/>
           </a:p>
           <a:p>
             <a:r>
@@ -10051,12 +9911,14 @@
               <a:rPr lang="en-US" sz="2000" dirty="0"/>
               <a:t> having shaped our journey of learning  data science. </a:t>
             </a:r>
+            <a:endParaRPr lang="en-US" sz="2000" dirty="0"/>
           </a:p>
           <a:p>
             <a:r>
               <a:rPr lang="en-US" sz="2000" dirty="0"/>
               <a:t>All our colleagues who have been helping us to debug whenever in need.</a:t>
             </a:r>
+            <a:endParaRPr lang="en-US" sz="2000" dirty="0"/>
           </a:p>
         </p:txBody>
       </p:sp>
@@ -10100,7 +9962,6 @@
           <a:p>
             <a:fld id="{C4C7283F-616F-4503-ABBD-21FFB2848302}" type="slidenum">
               <a:rPr lang="en-US" smtClean="0"/>
-              <a:t>21</a:t>
             </a:fld>
             <a:endParaRPr lang="en-US"/>
           </a:p>
@@ -10189,6 +10050,7 @@
               <a:rPr lang="en-US" sz="2400" dirty="0"/>
               <a:t>Testing the nature of the data.</a:t>
             </a:r>
+            <a:endParaRPr lang="en-US" sz="2400" dirty="0"/>
           </a:p>
           <a:p>
             <a:pPr marL="457200" indent="-457200">
@@ -10199,6 +10061,7 @@
               <a:rPr lang="en-US" sz="2400" dirty="0"/>
               <a:t>Setting confidence interval.</a:t>
             </a:r>
+            <a:endParaRPr lang="en-US" sz="2400" dirty="0"/>
           </a:p>
           <a:p>
             <a:pPr marL="457200" indent="-457200">
@@ -10209,6 +10072,7 @@
               <a:rPr lang="en-US" sz="2400" dirty="0"/>
               <a:t>Checking on the statistics of the average rating and total gross.</a:t>
             </a:r>
+            <a:endParaRPr lang="en-US" sz="2400" dirty="0"/>
           </a:p>
           <a:p>
             <a:pPr marL="457200" indent="-457200">
@@ -10219,6 +10083,7 @@
               <a:rPr lang="en-US" sz="2400" dirty="0"/>
               <a:t>Stating the Null and alternative hypothesis.</a:t>
             </a:r>
+            <a:endParaRPr lang="en-US" sz="2400" dirty="0"/>
           </a:p>
           <a:p>
             <a:pPr marL="457200" indent="-457200">
@@ -10229,6 +10094,7 @@
               <a:rPr lang="en-US" sz="2400" dirty="0"/>
               <a:t>Fail to reject the null hypothesis or not.</a:t>
             </a:r>
+            <a:endParaRPr lang="en-US" sz="2400" dirty="0"/>
           </a:p>
           <a:p>
             <a:pPr>
@@ -10292,7 +10158,6 @@
           <a:p>
             <a:fld id="{C4C7283F-616F-4503-ABBD-21FFB2848302}" type="slidenum">
               <a:rPr lang="en-US" smtClean="0"/>
-              <a:t>22</a:t>
             </a:fld>
             <a:endParaRPr lang="en-US"/>
           </a:p>
@@ -10311,13 +10176,7 @@
   <p:cSld>
     <p:spTree>
       <p:nvGrpSpPr>
-        <p:cNvPr id="1" name="">
-          <a:extLst>
-            <a:ext uri="{FF2B5EF4-FFF2-40B4-BE49-F238E27FC236}">
-              <a16:creationId xmlns:a16="http://schemas.microsoft.com/office/drawing/2014/main" id="{6FCC7B1A-BD10-40B4-FAB4-7C720FBD0FE0}"/>
-            </a:ext>
-          </a:extLst>
-        </p:cNvPr>
+        <p:cNvPr id="1" name=""/>
         <p:cNvGrpSpPr/>
         <p:nvPr/>
       </p:nvGrpSpPr>
@@ -10331,13 +10190,7 @@
       </p:grpSpPr>
       <p:sp>
         <p:nvSpPr>
-          <p:cNvPr id="2" name="Title 1">
-            <a:extLst>
-              <a:ext uri="{FF2B5EF4-FFF2-40B4-BE49-F238E27FC236}">
-                <a16:creationId xmlns:a16="http://schemas.microsoft.com/office/drawing/2014/main" id="{39DBFD59-DE29-5847-C150-23FA2BAE1D0B}"/>
-              </a:ext>
-            </a:extLst>
-          </p:cNvPr>
+          <p:cNvPr id="2" name="Title 1"/>
           <p:cNvSpPr>
             <a:spLocks noGrp="1"/>
           </p:cNvSpPr>
@@ -10360,18 +10213,13 @@
               <a:rPr lang="en-US" sz="4800" dirty="0"/>
               <a:t>		Testing the nature of the data	</a:t>
             </a:r>
-          </a:p>
-        </p:txBody>
-      </p:sp>
-      <p:sp>
-        <p:nvSpPr>
-          <p:cNvPr id="4" name="Footer Placeholder 3">
-            <a:extLst>
-              <a:ext uri="{FF2B5EF4-FFF2-40B4-BE49-F238E27FC236}">
-                <a16:creationId xmlns:a16="http://schemas.microsoft.com/office/drawing/2014/main" id="{68FDA7E6-C79D-203E-053A-719DFF8DC45E}"/>
-              </a:ext>
-            </a:extLst>
-          </p:cNvPr>
+            <a:endParaRPr lang="en-US" sz="4800" dirty="0"/>
+          </a:p>
+        </p:txBody>
+      </p:sp>
+      <p:sp>
+        <p:nvSpPr>
+          <p:cNvPr id="4" name="Footer Placeholder 3"/>
           <p:cNvSpPr>
             <a:spLocks noGrp="1"/>
           </p:cNvSpPr>
@@ -10394,13 +10242,7 @@
       </p:sp>
       <p:sp>
         <p:nvSpPr>
-          <p:cNvPr id="6" name="Slide Number Placeholder 5">
-            <a:extLst>
-              <a:ext uri="{FF2B5EF4-FFF2-40B4-BE49-F238E27FC236}">
-                <a16:creationId xmlns:a16="http://schemas.microsoft.com/office/drawing/2014/main" id="{348930E6-8F46-3891-A4EF-BA2BB960C11B}"/>
-              </a:ext>
-            </a:extLst>
-          </p:cNvPr>
+          <p:cNvPr id="6" name="Slide Number Placeholder 5"/>
           <p:cNvSpPr>
             <a:spLocks noGrp="1"/>
           </p:cNvSpPr>
@@ -10415,7 +10257,6 @@
           <a:p>
             <a:fld id="{C4C7283F-616F-4503-ABBD-21FFB2848302}" type="slidenum">
               <a:rPr lang="en-US" smtClean="0"/>
-              <a:t>23</a:t>
             </a:fld>
             <a:endParaRPr lang="en-US"/>
           </a:p>
@@ -10423,20 +10264,14 @@
       </p:sp>
       <p:pic>
         <p:nvPicPr>
-          <p:cNvPr id="5" name="Picture 4">
-            <a:extLst>
-              <a:ext uri="{FF2B5EF4-FFF2-40B4-BE49-F238E27FC236}">
-                <a16:creationId xmlns:a16="http://schemas.microsoft.com/office/drawing/2014/main" id="{80AEDBC8-073B-764A-D616-619F072FA8A6}"/>
-              </a:ext>
-            </a:extLst>
-          </p:cNvPr>
+          <p:cNvPr id="5" name="Picture 4"/>
           <p:cNvPicPr>
             <a:picLocks noChangeAspect="1"/>
           </p:cNvPicPr>
           <p:nvPr/>
         </p:nvPicPr>
         <p:blipFill>
-          <a:blip r:embed="rId3">
+          <a:blip r:embed="rId1">
             <a:extLst>
               <a:ext uri="{28A0092B-C50C-407E-A947-70E740481C1C}">
                 <a14:useLocalDpi xmlns:a14="http://schemas.microsoft.com/office/drawing/2010/main" val="0"/>
@@ -10444,7 +10279,9 @@
             </a:extLst>
           </a:blip>
           <a:srcRect/>
-          <a:stretch/>
+          <a:stretch>
+            <a:fillRect/>
+          </a:stretch>
         </p:blipFill>
         <p:spPr>
           <a:xfrm>
@@ -10458,13 +10295,7 @@
       </p:pic>
       <p:sp>
         <p:nvSpPr>
-          <p:cNvPr id="12" name="Subtitle 11">
-            <a:extLst>
-              <a:ext uri="{FF2B5EF4-FFF2-40B4-BE49-F238E27FC236}">
-                <a16:creationId xmlns:a16="http://schemas.microsoft.com/office/drawing/2014/main" id="{16A4AD93-23F9-2E81-6AAB-3667DD48C060}"/>
-              </a:ext>
-            </a:extLst>
-          </p:cNvPr>
+          <p:cNvPr id="12" name="Subtitle 11"/>
           <p:cNvSpPr>
             <a:spLocks noGrp="1"/>
           </p:cNvSpPr>
@@ -10477,16 +10308,11 @@
           <a:bodyPr/>
           <a:lstStyle/>
           <a:p>
-            <a:endParaRPr lang="en-KE"/>
+            <a:endParaRPr lang="en-US"/>
           </a:p>
         </p:txBody>
       </p:sp>
     </p:spTree>
-    <p:extLst>
-      <p:ext uri="{BB962C8B-B14F-4D97-AF65-F5344CB8AC3E}">
-        <p14:creationId xmlns:p14="http://schemas.microsoft.com/office/powerpoint/2010/main" val="3122496624"/>
-      </p:ext>
-    </p:extLst>
   </p:cSld>
   <p:clrMapOvr>
     <a:masterClrMapping/>
@@ -10499,13 +10325,7 @@
   <p:cSld>
     <p:spTree>
       <p:nvGrpSpPr>
-        <p:cNvPr id="1" name="">
-          <a:extLst>
-            <a:ext uri="{FF2B5EF4-FFF2-40B4-BE49-F238E27FC236}">
-              <a16:creationId xmlns:a16="http://schemas.microsoft.com/office/drawing/2014/main" id="{D635C11B-E14B-F8D8-C15C-8E8D4DB0A864}"/>
-            </a:ext>
-          </a:extLst>
-        </p:cNvPr>
+        <p:cNvPr id="1" name=""/>
         <p:cNvGrpSpPr/>
         <p:nvPr/>
       </p:nvGrpSpPr>
@@ -10519,13 +10339,7 @@
       </p:grpSpPr>
       <p:sp>
         <p:nvSpPr>
-          <p:cNvPr id="2" name="Title 1">
-            <a:extLst>
-              <a:ext uri="{FF2B5EF4-FFF2-40B4-BE49-F238E27FC236}">
-                <a16:creationId xmlns:a16="http://schemas.microsoft.com/office/drawing/2014/main" id="{8D6825A0-35AB-1BD1-BDA6-9EF48F673952}"/>
-              </a:ext>
-            </a:extLst>
-          </p:cNvPr>
+          <p:cNvPr id="2" name="Title 1"/>
           <p:cNvSpPr>
             <a:spLocks noGrp="1"/>
           </p:cNvSpPr>
@@ -10554,13 +10368,7 @@
       </p:sp>
       <p:sp>
         <p:nvSpPr>
-          <p:cNvPr id="4" name="Footer Placeholder 3">
-            <a:extLst>
-              <a:ext uri="{FF2B5EF4-FFF2-40B4-BE49-F238E27FC236}">
-                <a16:creationId xmlns:a16="http://schemas.microsoft.com/office/drawing/2014/main" id="{F6603DF3-C916-5C82-E5A2-1145C255B064}"/>
-              </a:ext>
-            </a:extLst>
-          </p:cNvPr>
+          <p:cNvPr id="4" name="Footer Placeholder 3"/>
           <p:cNvSpPr>
             <a:spLocks noGrp="1"/>
           </p:cNvSpPr>
@@ -10583,13 +10391,7 @@
       </p:sp>
       <p:sp>
         <p:nvSpPr>
-          <p:cNvPr id="6" name="Slide Number Placeholder 5">
-            <a:extLst>
-              <a:ext uri="{FF2B5EF4-FFF2-40B4-BE49-F238E27FC236}">
-                <a16:creationId xmlns:a16="http://schemas.microsoft.com/office/drawing/2014/main" id="{5BB945A2-7249-2759-D95C-3DF3AB5176F6}"/>
-              </a:ext>
-            </a:extLst>
-          </p:cNvPr>
+          <p:cNvPr id="6" name="Slide Number Placeholder 5"/>
           <p:cNvSpPr>
             <a:spLocks noGrp="1"/>
           </p:cNvSpPr>
@@ -10604,7 +10406,6 @@
           <a:p>
             <a:fld id="{C4C7283F-616F-4503-ABBD-21FFB2848302}" type="slidenum">
               <a:rPr lang="en-US" smtClean="0"/>
-              <a:t>24</a:t>
             </a:fld>
             <a:endParaRPr lang="en-US"/>
           </a:p>
@@ -10612,20 +10413,14 @@
       </p:sp>
       <p:pic>
         <p:nvPicPr>
-          <p:cNvPr id="5" name="Picture 4">
-            <a:extLst>
-              <a:ext uri="{FF2B5EF4-FFF2-40B4-BE49-F238E27FC236}">
-                <a16:creationId xmlns:a16="http://schemas.microsoft.com/office/drawing/2014/main" id="{F2101D8D-07EB-618C-2560-7F0E9BE616C9}"/>
-              </a:ext>
-            </a:extLst>
-          </p:cNvPr>
+          <p:cNvPr id="5" name="Picture 4"/>
           <p:cNvPicPr>
             <a:picLocks noChangeAspect="1"/>
           </p:cNvPicPr>
           <p:nvPr/>
         </p:nvPicPr>
         <p:blipFill>
-          <a:blip r:embed="rId3">
+          <a:blip r:embed="rId1">
             <a:extLst>
               <a:ext uri="{28A0092B-C50C-407E-A947-70E740481C1C}">
                 <a14:useLocalDpi xmlns:a14="http://schemas.microsoft.com/office/drawing/2010/main" val="0"/>
@@ -10633,7 +10428,9 @@
             </a:extLst>
           </a:blip>
           <a:srcRect/>
-          <a:stretch/>
+          <a:stretch>
+            <a:fillRect/>
+          </a:stretch>
         </p:blipFill>
         <p:spPr>
           <a:xfrm>
@@ -10647,13 +10444,7 @@
       </p:pic>
       <p:sp>
         <p:nvSpPr>
-          <p:cNvPr id="12" name="Subtitle 11">
-            <a:extLst>
-              <a:ext uri="{FF2B5EF4-FFF2-40B4-BE49-F238E27FC236}">
-                <a16:creationId xmlns:a16="http://schemas.microsoft.com/office/drawing/2014/main" id="{B1F122F1-4271-758C-4D14-D62DAE31E331}"/>
-              </a:ext>
-            </a:extLst>
-          </p:cNvPr>
+          <p:cNvPr id="12" name="Subtitle 11"/>
           <p:cNvSpPr>
             <a:spLocks noGrp="1"/>
           </p:cNvSpPr>
@@ -10678,26 +10469,20 @@
               <a:rPr lang="en-GB" sz="2000" b="1" dirty="0"/>
               <a:t>Average rating</a:t>
             </a:r>
-            <a:endParaRPr lang="en-KE" sz="2000" b="1" dirty="0"/>
+            <a:endParaRPr lang="en-US" sz="2000" b="1" dirty="0"/>
           </a:p>
         </p:txBody>
       </p:sp>
       <p:pic>
         <p:nvPicPr>
-          <p:cNvPr id="3" name="Picture 2">
-            <a:extLst>
-              <a:ext uri="{FF2B5EF4-FFF2-40B4-BE49-F238E27FC236}">
-                <a16:creationId xmlns:a16="http://schemas.microsoft.com/office/drawing/2014/main" id="{D91A44AE-F76D-70F6-232F-6F8E61EA425D}"/>
-              </a:ext>
-            </a:extLst>
-          </p:cNvPr>
+          <p:cNvPr id="3" name="Picture 2"/>
           <p:cNvPicPr>
             <a:picLocks noChangeAspect="1"/>
           </p:cNvPicPr>
           <p:nvPr/>
         </p:nvPicPr>
         <p:blipFill>
-          <a:blip r:embed="rId4">
+          <a:blip r:embed="rId2">
             <a:extLst>
               <a:ext uri="{28A0092B-C50C-407E-A947-70E740481C1C}">
                 <a14:useLocalDpi xmlns:a14="http://schemas.microsoft.com/office/drawing/2010/main" val="0"/>
@@ -10705,7 +10490,9 @@
             </a:extLst>
           </a:blip>
           <a:srcRect/>
-          <a:stretch/>
+          <a:stretch>
+            <a:fillRect/>
+          </a:stretch>
         </p:blipFill>
         <p:spPr>
           <a:xfrm>
@@ -10719,16 +10506,8 @@
       </p:pic>
       <p:sp>
         <p:nvSpPr>
-          <p:cNvPr id="7" name="Subtitle 11">
-            <a:extLst>
-              <a:ext uri="{FF2B5EF4-FFF2-40B4-BE49-F238E27FC236}">
-                <a16:creationId xmlns:a16="http://schemas.microsoft.com/office/drawing/2014/main" id="{AD491E7D-3582-501B-35B2-A4695D9A535D}"/>
-              </a:ext>
-            </a:extLst>
-          </p:cNvPr>
-          <p:cNvSpPr txBox="1">
-            <a:spLocks/>
-          </p:cNvSpPr>
+          <p:cNvPr id="7" name="Subtitle 11"/>
+          <p:cNvSpPr txBox="1"/>
           <p:nvPr/>
         </p:nvSpPr>
         <p:spPr>
@@ -10969,16 +10748,11 @@
               <a:rPr lang="en-GB" sz="2000" b="1" dirty="0"/>
               <a:t>Total gross</a:t>
             </a:r>
-            <a:endParaRPr lang="en-KE" sz="2000" b="1" dirty="0"/>
+            <a:endParaRPr lang="en-US" sz="2000" b="1" dirty="0"/>
           </a:p>
         </p:txBody>
       </p:sp>
     </p:spTree>
-    <p:extLst>
-      <p:ext uri="{BB962C8B-B14F-4D97-AF65-F5344CB8AC3E}">
-        <p14:creationId xmlns:p14="http://schemas.microsoft.com/office/powerpoint/2010/main" val="1898261849"/>
-      </p:ext>
-    </p:extLst>
   </p:cSld>
   <p:clrMapOvr>
     <a:masterClrMapping/>
@@ -10991,13 +10765,7 @@
   <p:cSld>
     <p:spTree>
       <p:nvGrpSpPr>
-        <p:cNvPr id="1" name="">
-          <a:extLst>
-            <a:ext uri="{FF2B5EF4-FFF2-40B4-BE49-F238E27FC236}">
-              <a16:creationId xmlns:a16="http://schemas.microsoft.com/office/drawing/2014/main" id="{B6E0B431-6B61-7B15-1C6C-80702A58CB9E}"/>
-            </a:ext>
-          </a:extLst>
-        </p:cNvPr>
+        <p:cNvPr id="1" name=""/>
         <p:cNvGrpSpPr/>
         <p:nvPr/>
       </p:nvGrpSpPr>
@@ -11011,13 +10779,7 @@
       </p:grpSpPr>
       <p:sp>
         <p:nvSpPr>
-          <p:cNvPr id="2" name="Title 1">
-            <a:extLst>
-              <a:ext uri="{FF2B5EF4-FFF2-40B4-BE49-F238E27FC236}">
-                <a16:creationId xmlns:a16="http://schemas.microsoft.com/office/drawing/2014/main" id="{403A5981-7DE9-5CBB-DBDB-DCF126C09711}"/>
-              </a:ext>
-            </a:extLst>
-          </p:cNvPr>
+          <p:cNvPr id="2" name="Title 1"/>
           <p:cNvSpPr>
             <a:spLocks noGrp="1"/>
           </p:cNvSpPr>
@@ -11046,13 +10808,7 @@
       </p:sp>
       <p:sp>
         <p:nvSpPr>
-          <p:cNvPr id="4" name="Footer Placeholder 3">
-            <a:extLst>
-              <a:ext uri="{FF2B5EF4-FFF2-40B4-BE49-F238E27FC236}">
-                <a16:creationId xmlns:a16="http://schemas.microsoft.com/office/drawing/2014/main" id="{E85CB493-109E-AD43-E865-6465594C58B6}"/>
-              </a:ext>
-            </a:extLst>
-          </p:cNvPr>
+          <p:cNvPr id="4" name="Footer Placeholder 3"/>
           <p:cNvSpPr>
             <a:spLocks noGrp="1"/>
           </p:cNvSpPr>
@@ -11075,13 +10831,7 @@
       </p:sp>
       <p:sp>
         <p:nvSpPr>
-          <p:cNvPr id="6" name="Slide Number Placeholder 5">
-            <a:extLst>
-              <a:ext uri="{FF2B5EF4-FFF2-40B4-BE49-F238E27FC236}">
-                <a16:creationId xmlns:a16="http://schemas.microsoft.com/office/drawing/2014/main" id="{A4C8C40D-AE18-E411-B225-9166410D8871}"/>
-              </a:ext>
-            </a:extLst>
-          </p:cNvPr>
+          <p:cNvPr id="6" name="Slide Number Placeholder 5"/>
           <p:cNvSpPr>
             <a:spLocks noGrp="1"/>
           </p:cNvSpPr>
@@ -11096,7 +10846,6 @@
           <a:p>
             <a:fld id="{C4C7283F-616F-4503-ABBD-21FFB2848302}" type="slidenum">
               <a:rPr lang="en-US" smtClean="0"/>
-              <a:t>25</a:t>
             </a:fld>
             <a:endParaRPr lang="en-US"/>
           </a:p>
@@ -11104,20 +10853,14 @@
       </p:sp>
       <p:pic>
         <p:nvPicPr>
-          <p:cNvPr id="5" name="Picture 4">
-            <a:extLst>
-              <a:ext uri="{FF2B5EF4-FFF2-40B4-BE49-F238E27FC236}">
-                <a16:creationId xmlns:a16="http://schemas.microsoft.com/office/drawing/2014/main" id="{9989903B-4539-7C4D-CFA4-C9C78F4D9A70}"/>
-              </a:ext>
-            </a:extLst>
-          </p:cNvPr>
+          <p:cNvPr id="5" name="Picture 4"/>
           <p:cNvPicPr>
             <a:picLocks noChangeAspect="1"/>
           </p:cNvPicPr>
           <p:nvPr/>
         </p:nvPicPr>
         <p:blipFill>
-          <a:blip r:embed="rId3">
+          <a:blip r:embed="rId1">
             <a:extLst>
               <a:ext uri="{28A0092B-C50C-407E-A947-70E740481C1C}">
                 <a14:useLocalDpi xmlns:a14="http://schemas.microsoft.com/office/drawing/2010/main" val="0"/>
@@ -11125,7 +10868,9 @@
             </a:extLst>
           </a:blip>
           <a:srcRect/>
-          <a:stretch/>
+          <a:stretch>
+            <a:fillRect/>
+          </a:stretch>
         </p:blipFill>
         <p:spPr>
           <a:xfrm>
@@ -11139,13 +10884,7 @@
       </p:pic>
       <p:sp>
         <p:nvSpPr>
-          <p:cNvPr id="12" name="Subtitle 11">
-            <a:extLst>
-              <a:ext uri="{FF2B5EF4-FFF2-40B4-BE49-F238E27FC236}">
-                <a16:creationId xmlns:a16="http://schemas.microsoft.com/office/drawing/2014/main" id="{36583669-E96D-FE3D-5EDD-3B72BEA2E5CD}"/>
-              </a:ext>
-            </a:extLst>
-          </p:cNvPr>
+          <p:cNvPr id="12" name="Subtitle 11"/>
           <p:cNvSpPr>
             <a:spLocks noGrp="1"/>
           </p:cNvSpPr>
@@ -11170,26 +10909,20 @@
               <a:rPr lang="en-GB" sz="2000" b="1" dirty="0"/>
               <a:t>Average rating</a:t>
             </a:r>
-            <a:endParaRPr lang="en-KE" sz="2000" b="1" dirty="0"/>
+            <a:endParaRPr lang="en-US" sz="2000" b="1" dirty="0"/>
           </a:p>
         </p:txBody>
       </p:sp>
       <p:pic>
         <p:nvPicPr>
-          <p:cNvPr id="3" name="Picture 2">
-            <a:extLst>
-              <a:ext uri="{FF2B5EF4-FFF2-40B4-BE49-F238E27FC236}">
-                <a16:creationId xmlns:a16="http://schemas.microsoft.com/office/drawing/2014/main" id="{551F6056-7BE0-23F9-B26B-45B66A046727}"/>
-              </a:ext>
-            </a:extLst>
-          </p:cNvPr>
+          <p:cNvPr id="3" name="Picture 2"/>
           <p:cNvPicPr>
             <a:picLocks noChangeAspect="1"/>
           </p:cNvPicPr>
           <p:nvPr/>
         </p:nvPicPr>
         <p:blipFill>
-          <a:blip r:embed="rId4">
+          <a:blip r:embed="rId2">
             <a:extLst>
               <a:ext uri="{28A0092B-C50C-407E-A947-70E740481C1C}">
                 <a14:useLocalDpi xmlns:a14="http://schemas.microsoft.com/office/drawing/2010/main" val="0"/>
@@ -11197,7 +10930,9 @@
             </a:extLst>
           </a:blip>
           <a:srcRect/>
-          <a:stretch/>
+          <a:stretch>
+            <a:fillRect/>
+          </a:stretch>
         </p:blipFill>
         <p:spPr>
           <a:xfrm>
@@ -11211,16 +10946,8 @@
       </p:pic>
       <p:sp>
         <p:nvSpPr>
-          <p:cNvPr id="7" name="Subtitle 11">
-            <a:extLst>
-              <a:ext uri="{FF2B5EF4-FFF2-40B4-BE49-F238E27FC236}">
-                <a16:creationId xmlns:a16="http://schemas.microsoft.com/office/drawing/2014/main" id="{A169F4A4-FC43-D8EA-D76B-E015BEBD5817}"/>
-              </a:ext>
-            </a:extLst>
-          </p:cNvPr>
-          <p:cNvSpPr txBox="1">
-            <a:spLocks/>
-          </p:cNvSpPr>
+          <p:cNvPr id="7" name="Subtitle 11"/>
+          <p:cNvSpPr txBox="1"/>
           <p:nvPr/>
         </p:nvSpPr>
         <p:spPr>
@@ -11461,16 +11188,11 @@
               <a:rPr lang="en-GB" sz="2000" b="1" dirty="0"/>
               <a:t>Total gross</a:t>
             </a:r>
-            <a:endParaRPr lang="en-KE" sz="2000" b="1" dirty="0"/>
+            <a:endParaRPr lang="en-US" sz="2000" b="1" dirty="0"/>
           </a:p>
         </p:txBody>
       </p:sp>
     </p:spTree>
-    <p:extLst>
-      <p:ext uri="{BB962C8B-B14F-4D97-AF65-F5344CB8AC3E}">
-        <p14:creationId xmlns:p14="http://schemas.microsoft.com/office/powerpoint/2010/main" val="1112941859"/>
-      </p:ext>
-    </p:extLst>
   </p:cSld>
   <p:clrMapOvr>
     <a:masterClrMapping/>
@@ -11483,13 +11205,7 @@
   <p:cSld>
     <p:spTree>
       <p:nvGrpSpPr>
-        <p:cNvPr id="1" name="">
-          <a:extLst>
-            <a:ext uri="{FF2B5EF4-FFF2-40B4-BE49-F238E27FC236}">
-              <a16:creationId xmlns:a16="http://schemas.microsoft.com/office/drawing/2014/main" id="{AB3DCAEE-A440-2448-7954-9D7C9BC762BF}"/>
-            </a:ext>
-          </a:extLst>
-        </p:cNvPr>
+        <p:cNvPr id="1" name=""/>
         <p:cNvGrpSpPr/>
         <p:nvPr/>
       </p:nvGrpSpPr>
@@ -11503,13 +11219,7 @@
       </p:grpSpPr>
       <p:sp>
         <p:nvSpPr>
-          <p:cNvPr id="2" name="Title 1">
-            <a:extLst>
-              <a:ext uri="{FF2B5EF4-FFF2-40B4-BE49-F238E27FC236}">
-                <a16:creationId xmlns:a16="http://schemas.microsoft.com/office/drawing/2014/main" id="{5301C2B0-D3E6-6911-239F-9F4229D1B78D}"/>
-              </a:ext>
-            </a:extLst>
-          </p:cNvPr>
+          <p:cNvPr id="2" name="Title 1"/>
           <p:cNvSpPr>
             <a:spLocks noGrp="1"/>
           </p:cNvSpPr>
@@ -11532,18 +11242,13 @@
               <a:rPr lang="en-US" sz="4800" dirty="0"/>
               <a:t>Null and alternative hypothesis.</a:t>
             </a:r>
-          </a:p>
-        </p:txBody>
-      </p:sp>
-      <p:sp>
-        <p:nvSpPr>
-          <p:cNvPr id="4" name="Footer Placeholder 3">
-            <a:extLst>
-              <a:ext uri="{FF2B5EF4-FFF2-40B4-BE49-F238E27FC236}">
-                <a16:creationId xmlns:a16="http://schemas.microsoft.com/office/drawing/2014/main" id="{BEFB2A7B-77B3-80D2-CDDB-985F1EA49DA6}"/>
-              </a:ext>
-            </a:extLst>
-          </p:cNvPr>
+            <a:endParaRPr lang="en-US" sz="4800" dirty="0"/>
+          </a:p>
+        </p:txBody>
+      </p:sp>
+      <p:sp>
+        <p:nvSpPr>
+          <p:cNvPr id="4" name="Footer Placeholder 3"/>
           <p:cNvSpPr>
             <a:spLocks noGrp="1"/>
           </p:cNvSpPr>
@@ -11566,13 +11271,7 @@
       </p:sp>
       <p:sp>
         <p:nvSpPr>
-          <p:cNvPr id="6" name="Slide Number Placeholder 5">
-            <a:extLst>
-              <a:ext uri="{FF2B5EF4-FFF2-40B4-BE49-F238E27FC236}">
-                <a16:creationId xmlns:a16="http://schemas.microsoft.com/office/drawing/2014/main" id="{FF07E8D6-486D-D165-8D7C-BE48310D1F53}"/>
-              </a:ext>
-            </a:extLst>
-          </p:cNvPr>
+          <p:cNvPr id="6" name="Slide Number Placeholder 5"/>
           <p:cNvSpPr>
             <a:spLocks noGrp="1"/>
           </p:cNvSpPr>
@@ -11587,7 +11286,6 @@
           <a:p>
             <a:fld id="{C4C7283F-616F-4503-ABBD-21FFB2848302}" type="slidenum">
               <a:rPr lang="en-US" smtClean="0"/>
-              <a:t>26</a:t>
             </a:fld>
             <a:endParaRPr lang="en-US"/>
           </a:p>
@@ -11595,13 +11293,7 @@
       </p:sp>
       <p:sp>
         <p:nvSpPr>
-          <p:cNvPr id="12" name="Subtitle 11">
-            <a:extLst>
-              <a:ext uri="{FF2B5EF4-FFF2-40B4-BE49-F238E27FC236}">
-                <a16:creationId xmlns:a16="http://schemas.microsoft.com/office/drawing/2014/main" id="{3A095314-98F7-857D-49F4-3E404B74FB87}"/>
-              </a:ext>
-            </a:extLst>
-          </p:cNvPr>
+          <p:cNvPr id="12" name="Subtitle 11"/>
           <p:cNvSpPr>
             <a:spLocks noGrp="1"/>
           </p:cNvSpPr>
@@ -11626,22 +11318,14 @@
               <a:rPr lang="en-GB" sz="2000" b="1" dirty="0"/>
               <a:t>Average rating</a:t>
             </a:r>
-            <a:endParaRPr lang="en-KE" sz="2000" b="1" dirty="0"/>
-          </a:p>
-        </p:txBody>
-      </p:sp>
-      <p:sp>
-        <p:nvSpPr>
-          <p:cNvPr id="7" name="Subtitle 11">
-            <a:extLst>
-              <a:ext uri="{FF2B5EF4-FFF2-40B4-BE49-F238E27FC236}">
-                <a16:creationId xmlns:a16="http://schemas.microsoft.com/office/drawing/2014/main" id="{197FF7F9-3536-D2FF-0438-4E3EF1021697}"/>
-              </a:ext>
-            </a:extLst>
-          </p:cNvPr>
-          <p:cNvSpPr txBox="1">
-            <a:spLocks/>
-          </p:cNvSpPr>
+            <a:endParaRPr lang="en-US" sz="2000" b="1" dirty="0"/>
+          </a:p>
+        </p:txBody>
+      </p:sp>
+      <p:sp>
+        <p:nvSpPr>
+          <p:cNvPr id="7" name="Subtitle 11"/>
+          <p:cNvSpPr txBox="1"/>
           <p:nvPr/>
         </p:nvSpPr>
         <p:spPr>
@@ -11882,26 +11566,20 @@
               <a:rPr lang="en-GB" sz="2000" b="1" dirty="0"/>
               <a:t>Total gross</a:t>
             </a:r>
-            <a:endParaRPr lang="en-KE" sz="2000" b="1" dirty="0"/>
+            <a:endParaRPr lang="en-US" sz="2000" b="1" dirty="0"/>
           </a:p>
         </p:txBody>
       </p:sp>
       <p:pic>
         <p:nvPicPr>
-          <p:cNvPr id="9" name="Picture 8">
-            <a:extLst>
-              <a:ext uri="{FF2B5EF4-FFF2-40B4-BE49-F238E27FC236}">
-                <a16:creationId xmlns:a16="http://schemas.microsoft.com/office/drawing/2014/main" id="{636D5011-537D-95DE-7799-91E782000C8F}"/>
-              </a:ext>
-            </a:extLst>
-          </p:cNvPr>
+          <p:cNvPr id="9" name="Picture 8"/>
           <p:cNvPicPr>
             <a:picLocks noChangeAspect="1"/>
           </p:cNvPicPr>
           <p:nvPr/>
         </p:nvPicPr>
         <p:blipFill>
-          <a:blip r:embed="rId3"/>
+          <a:blip r:embed="rId1"/>
           <a:stretch>
             <a:fillRect/>
           </a:stretch>
@@ -11918,20 +11596,14 @@
       </p:pic>
       <p:pic>
         <p:nvPicPr>
-          <p:cNvPr id="14" name="Picture 13">
-            <a:extLst>
-              <a:ext uri="{FF2B5EF4-FFF2-40B4-BE49-F238E27FC236}">
-                <a16:creationId xmlns:a16="http://schemas.microsoft.com/office/drawing/2014/main" id="{EC2ADFCD-39FC-B8EC-39DD-8FA0FB07F94E}"/>
-              </a:ext>
-            </a:extLst>
-          </p:cNvPr>
+          <p:cNvPr id="14" name="Picture 13"/>
           <p:cNvPicPr>
             <a:picLocks noChangeAspect="1"/>
           </p:cNvPicPr>
           <p:nvPr/>
         </p:nvPicPr>
         <p:blipFill>
-          <a:blip r:embed="rId4">
+          <a:blip r:embed="rId2">
             <a:extLst>
               <a:ext uri="{28A0092B-C50C-407E-A947-70E740481C1C}">
                 <a14:useLocalDpi xmlns:a14="http://schemas.microsoft.com/office/drawing/2010/main" val="0"/>
@@ -11939,7 +11611,9 @@
             </a:extLst>
           </a:blip>
           <a:srcRect/>
-          <a:stretch/>
+          <a:stretch>
+            <a:fillRect/>
+          </a:stretch>
         </p:blipFill>
         <p:spPr>
           <a:xfrm>
@@ -11953,20 +11627,14 @@
       </p:pic>
       <p:pic>
         <p:nvPicPr>
-          <p:cNvPr id="16" name="Picture 15">
-            <a:extLst>
-              <a:ext uri="{FF2B5EF4-FFF2-40B4-BE49-F238E27FC236}">
-                <a16:creationId xmlns:a16="http://schemas.microsoft.com/office/drawing/2014/main" id="{BBDD1A75-AA96-A37D-4D8A-6D7609F77ECF}"/>
-              </a:ext>
-            </a:extLst>
-          </p:cNvPr>
+          <p:cNvPr id="16" name="Picture 15"/>
           <p:cNvPicPr>
             <a:picLocks noChangeAspect="1"/>
           </p:cNvPicPr>
           <p:nvPr/>
         </p:nvPicPr>
         <p:blipFill>
-          <a:blip r:embed="rId5"/>
+          <a:blip r:embed="rId3"/>
           <a:stretch>
             <a:fillRect/>
           </a:stretch>
@@ -11983,20 +11651,14 @@
       </p:pic>
       <p:pic>
         <p:nvPicPr>
-          <p:cNvPr id="18" name="Picture 17">
-            <a:extLst>
-              <a:ext uri="{FF2B5EF4-FFF2-40B4-BE49-F238E27FC236}">
-                <a16:creationId xmlns:a16="http://schemas.microsoft.com/office/drawing/2014/main" id="{96DCC258-80AB-69F5-E57B-46C782C9862D}"/>
-              </a:ext>
-            </a:extLst>
-          </p:cNvPr>
+          <p:cNvPr id="18" name="Picture 17"/>
           <p:cNvPicPr>
             <a:picLocks noChangeAspect="1"/>
           </p:cNvPicPr>
           <p:nvPr/>
         </p:nvPicPr>
         <p:blipFill>
-          <a:blip r:embed="rId6"/>
+          <a:blip r:embed="rId4"/>
           <a:stretch>
             <a:fillRect/>
           </a:stretch>
@@ -12012,11 +11674,6 @@
         </p:spPr>
       </p:pic>
     </p:spTree>
-    <p:extLst>
-      <p:ext uri="{BB962C8B-B14F-4D97-AF65-F5344CB8AC3E}">
-        <p14:creationId xmlns:p14="http://schemas.microsoft.com/office/powerpoint/2010/main" val="3590778099"/>
-      </p:ext>
-    </p:extLst>
   </p:cSld>
   <p:clrMapOvr>
     <a:masterClrMapping/>
@@ -12066,6 +11723,7 @@
               <a:rPr lang="en-US" dirty="0"/>
               <a:t>MODELING REPORT</a:t>
             </a:r>
+            <a:endParaRPr lang="en-US" dirty="0"/>
           </a:p>
         </p:txBody>
       </p:sp>
@@ -12081,8 +11739,8 @@
         </p:nvSpPr>
         <p:spPr>
           <a:xfrm>
-            <a:off x="1339115" y="1911202"/>
-            <a:ext cx="8364721" cy="3015361"/>
+            <a:off x="1339215" y="1911350"/>
+            <a:ext cx="9119235" cy="3797935"/>
           </a:xfrm>
         </p:spPr>
         <p:txBody>
@@ -12093,39 +11751,58 @@
           <a:p>
             <a:pPr algn="l"/>
             <a:r>
-              <a:rPr lang="en-GB" sz="2400" b="0" i="0" dirty="0">
-                <a:effectLst/>
-              </a:rPr>
-              <a:t>1] R² is computed without centering (uncentered) since the model does not contain a constant.</a:t>
-            </a:r>
-          </a:p>
-          <a:p>
-            <a:pPr algn="l"/>
-            <a:r>
-              <a:rPr lang="en-GB" sz="2400" b="0" i="0" dirty="0">
-                <a:effectLst/>
-              </a:rPr>
-              <a:t>[2] Standard Errors assume that the covariance matrix of the errors is correctly specified.</a:t>
-            </a:r>
-            <a:br>
-              <a:rPr lang="en-GB" sz="2400" dirty="0"/>
-            </a:br>
-            <a:r>
-              <a:rPr lang="en-GB" sz="2400" b="0" i="0" dirty="0">
-                <a:effectLst/>
-              </a:rPr>
-              <a:t>[3] The condition number is large, 1.74e+04. This might indicate that there are</a:t>
-            </a:r>
-            <a:br>
-              <a:rPr lang="en-GB" sz="2400" dirty="0"/>
-            </a:br>
-            <a:r>
-              <a:rPr lang="en-GB" sz="2400" b="0" i="0" dirty="0">
-                <a:effectLst/>
-              </a:rPr>
-              <a:t>strong multicollinearity or other numerical problems.</a:t>
-            </a:r>
-            <a:endParaRPr lang="en-US" sz="2400" dirty="0"/>
+              <a:rPr lang="en-US" altLang="en-GB" sz="2200" dirty="0"/>
+              <a:t>The logistic regression model's performance is suboptimal, as reflected by the following key observations:</a:t>
+            </a:r>
+            <a:endParaRPr lang="en-US" altLang="en-GB" sz="2200" dirty="0"/>
+          </a:p>
+          <a:p>
+            <a:pPr marL="457200" indent="-457200" algn="l">
+              <a:buFont typeface="+mj-lt"/>
+              <a:buAutoNum type="arabicPeriod"/>
+            </a:pPr>
+            <a:r>
+              <a:rPr lang="en-US" altLang="en-GB" sz="2200" dirty="0"/>
+              <a:t>High Errors: The MAE (65.66), MSE (8101.98), and RMSE (90.01) indicate significant prediction errors on average.</a:t>
+            </a:r>
+            <a:endParaRPr lang="en-US" altLang="en-GB" sz="2200" dirty="0"/>
+          </a:p>
+          <a:p>
+            <a:pPr marL="457200" indent="-457200" algn="l">
+              <a:buFont typeface="+mj-lt"/>
+              <a:buAutoNum type="arabicPeriod"/>
+            </a:pPr>
+            <a:r>
+              <a:rPr lang="en-US" altLang="en-GB" sz="2200" dirty="0"/>
+              <a:t> Negative R</a:t>
+            </a:r>
+            <a:r>
+              <a:rPr lang="en-US" altLang="en-US" sz="2200" dirty="0"/>
+              <a:t>²</a:t>
+            </a:r>
+            <a:r>
+              <a:rPr lang="en-US" altLang="en-GB" sz="2200" dirty="0"/>
+              <a:t> (-0.378): The negative R</a:t>
+            </a:r>
+            <a:r>
+              <a:rPr lang="en-US" altLang="en-US" sz="2200" dirty="0"/>
+              <a:t>²</a:t>
+            </a:r>
+            <a:r>
+              <a:rPr lang="en-US" altLang="en-GB" sz="2200" dirty="0"/>
+              <a:t> suggests the model performs worse than simply predicting the mean of the target variable.</a:t>
+            </a:r>
+            <a:endParaRPr lang="en-US" altLang="en-GB" sz="2200" dirty="0"/>
+          </a:p>
+          <a:p>
+            <a:pPr algn="l">
+              <a:buFont typeface="+mj-lt"/>
+            </a:pPr>
+            <a:r>
+              <a:rPr lang="en-US" altLang="en-GB" sz="2200" dirty="0"/>
+              <a:t>Model Improvements Needed: The model likely requires better feature engineering, data preprocessing, and possibly a different model approach to improve accuracy and fit.</a:t>
+            </a:r>
+            <a:endParaRPr lang="en-US" altLang="en-GB" sz="2200" dirty="0"/>
           </a:p>
         </p:txBody>
       </p:sp>
@@ -12169,7 +11846,6 @@
           <a:p>
             <a:fld id="{C4C7283F-616F-4503-ABBD-21FFB2848302}" type="slidenum">
               <a:rPr lang="en-US" smtClean="0"/>
-              <a:t>27</a:t>
             </a:fld>
             <a:endParaRPr lang="en-US"/>
           </a:p>
@@ -12226,6 +11902,7 @@
               <a:rPr lang="en-US" sz="4400" dirty="0"/>
               <a:t>CONCLUSION</a:t>
             </a:r>
+            <a:endParaRPr lang="en-US" sz="4400" dirty="0"/>
           </a:p>
         </p:txBody>
       </p:sp>
@@ -12261,6 +11938,9 @@
               </a:rPr>
               <a:t>From the analysis, it is clear that the Drama genre enjoys the highest ratings, but its box office success fluctuates over time. While the Adventure, Comedy, and Sci-Fi genres remain the highest-selling genres, this is likely due to their broad appeal and entertainment value. </a:t>
             </a:r>
+            <a:endParaRPr lang="en-US" altLang="en-GB" sz="2000" dirty="0">
+              <a:cs typeface="+mj-lt"/>
+            </a:endParaRPr>
           </a:p>
           <a:p>
             <a:pPr algn="l">
@@ -12273,6 +11953,9 @@
               </a:rPr>
               <a:t>Directors like Clint Eastwood and Jay Roach contribute significantly to the sales, with their strong reputations and professional standards. The ratings analysis also highlights the R rating's popularity, reflecting the tastes of adult audiences. </a:t>
             </a:r>
+            <a:endParaRPr lang="en-US" altLang="en-GB" sz="2000" dirty="0">
+              <a:cs typeface="+mj-lt"/>
+            </a:endParaRPr>
           </a:p>
           <a:p>
             <a:pPr algn="l">
@@ -12285,6 +11968,9 @@
               </a:rPr>
               <a:t>Overall, the variability in movie sales and ratings over the years is likely driven by factors such as market dynamics, audience preferences, and the quality of direction and production.</a:t>
             </a:r>
+            <a:endParaRPr lang="en-US" altLang="en-GB" sz="2000" dirty="0">
+              <a:cs typeface="+mj-lt"/>
+            </a:endParaRPr>
           </a:p>
           <a:p>
             <a:pPr algn="l">
@@ -12354,7 +12040,6 @@
           <a:p>
             <a:fld id="{C4C7283F-616F-4503-ABBD-21FFB2848302}" type="slidenum">
               <a:rPr lang="en-US" smtClean="0"/>
-              <a:t>28</a:t>
             </a:fld>
             <a:endParaRPr lang="en-US"/>
           </a:p>
@@ -12459,6 +12144,11 @@
               </a:rPr>
               <a:t>Prioritize Action and Comedy genres for future productions, as they have proven to be the most lucrative and widely appreciated.</a:t>
             </a:r>
+            <a:endParaRPr lang="en-US" sz="2400" kern="100" dirty="0">
+              <a:effectLst/>
+              <a:ea typeface="Calibri" panose="020F0502020204030204" pitchFamily="34" charset="0"/>
+              <a:cs typeface="Times New Roman" panose="02020603050405020304" pitchFamily="18" charset="0"/>
+            </a:endParaRPr>
           </a:p>
           <a:p>
             <a:pPr marL="342900" lvl="0" indent="-342900">
@@ -12482,6 +12172,11 @@
               </a:rPr>
               <a:t>Partner with top-rated directors (e.g., Steven Spielberg, Clint Eastwood) and writers (e.g., Woody Allen) to enhance critical and audience reception.</a:t>
             </a:r>
+            <a:endParaRPr lang="en-US" sz="2400" kern="100" dirty="0">
+              <a:effectLst/>
+              <a:ea typeface="Calibri" panose="020F0502020204030204" pitchFamily="34" charset="0"/>
+              <a:cs typeface="Times New Roman" panose="02020603050405020304" pitchFamily="18" charset="0"/>
+            </a:endParaRPr>
           </a:p>
           <a:p>
             <a:pPr marL="342900" lvl="0" indent="-342900">
@@ -12505,6 +12200,11 @@
               </a:rPr>
               <a:t>Optimize movie runtimes based on audience preferences; longer runtimes for Action and Adventure, and shorter runtimes for genres like Animation.</a:t>
             </a:r>
+            <a:endParaRPr lang="en-US" sz="2400" kern="100" dirty="0">
+              <a:effectLst/>
+              <a:ea typeface="Calibri" panose="020F0502020204030204" pitchFamily="34" charset="0"/>
+              <a:cs typeface="Times New Roman" panose="02020603050405020304" pitchFamily="18" charset="0"/>
+            </a:endParaRPr>
           </a:p>
           <a:p>
             <a:pPr marL="342900" lvl="0" indent="-342900">
@@ -12528,6 +12228,11 @@
               </a:rPr>
               <a:t>Leverage Universal Pictures for distribution due to their strong track record in generating high ratings.</a:t>
             </a:r>
+            <a:endParaRPr lang="en-US" sz="2400" kern="100" dirty="0">
+              <a:effectLst/>
+              <a:ea typeface="Calibri" panose="020F0502020204030204" pitchFamily="34" charset="0"/>
+              <a:cs typeface="Times New Roman" panose="02020603050405020304" pitchFamily="18" charset="0"/>
+            </a:endParaRPr>
           </a:p>
           <a:p>
             <a:endParaRPr lang="en-US" dirty="0"/>
@@ -12574,7 +12279,6 @@
           <a:p>
             <a:fld id="{C4C7283F-616F-4503-ABBD-21FFB2848302}" type="slidenum">
               <a:rPr lang="en-US" smtClean="0"/>
-              <a:t>29</a:t>
             </a:fld>
             <a:endParaRPr lang="en-US"/>
           </a:p>
@@ -12640,6 +12344,7 @@
               <a:rPr lang="en-US" dirty="0"/>
               <a:t>BUSINESS UNDERSTANDING</a:t>
             </a:r>
+            <a:endParaRPr lang="en-US" dirty="0"/>
           </a:p>
         </p:txBody>
       </p:sp>
@@ -12679,6 +12384,9 @@
               </a:rPr>
               <a:t> company now sees all the big companies creating original video content and they want to get in on the fun. They have decided to create a new movie studio, but they don’t know anything about creating movies. </a:t>
             </a:r>
+            <a:endParaRPr lang="en-GB" sz="2400" b="0" i="0" dirty="0">
+              <a:effectLst/>
+            </a:endParaRPr>
           </a:p>
           <a:p>
             <a:pPr marL="342900" indent="-342900" algn="l">
@@ -12735,7 +12443,6 @@
           <a:p>
             <a:fld id="{C4C7283F-616F-4503-ABBD-21FFB2848302}" type="slidenum">
               <a:rPr lang="en-US" smtClean="0"/>
-              <a:t>3</a:t>
             </a:fld>
             <a:endParaRPr lang="en-US"/>
           </a:p>
@@ -12812,13 +12519,7 @@
                 <a:solidFill>
                   <a:schemeClr val="accent1"/>
                 </a:solidFill>
-                <a:hlinkClick r:id="rId2">
-                  <a:extLst>
-                    <a:ext uri="{A12FA001-AC4F-418D-AE19-62706E023703}">
-                      <ahyp:hlinkClr xmlns:ahyp="http://schemas.microsoft.com/office/drawing/2018/hyperlinkcolor" val="tx"/>
-                    </a:ext>
-                  </a:extLst>
-                </a:hlinkClick>
+                <a:hlinkClick r:id="rId1"/>
               </a:rPr>
               <a:t>catherine.kiptui@student.moringaschool.com</a:t>
             </a:r>
@@ -12837,13 +12538,7 @@
                 <a:solidFill>
                   <a:schemeClr val="accent1"/>
                 </a:solidFill>
-                <a:hlinkClick r:id="rId3">
-                  <a:extLst>
-                    <a:ext uri="{A12FA001-AC4F-418D-AE19-62706E023703}">
-                      <ahyp:hlinkClr xmlns:ahyp="http://schemas.microsoft.com/office/drawing/2018/hyperlinkcolor" val="tx"/>
-                    </a:ext>
-                  </a:extLst>
-                </a:hlinkClick>
+                <a:hlinkClick r:id="rId2"/>
               </a:rPr>
               <a:t>michellekavetza@gmail.com</a:t>
             </a:r>
@@ -12862,13 +12557,7 @@
                 <a:solidFill>
                   <a:schemeClr val="accent1"/>
                 </a:solidFill>
-                <a:hlinkClick r:id="rId4">
-                  <a:extLst>
-                    <a:ext uri="{A12FA001-AC4F-418D-AE19-62706E023703}">
-                      <ahyp:hlinkClr xmlns:ahyp="http://schemas.microsoft.com/office/drawing/2018/hyperlinkcolor" val="tx"/>
-                    </a:ext>
-                  </a:extLst>
-                </a:hlinkClick>
+                <a:hlinkClick r:id="rId3"/>
               </a:rPr>
               <a:t>gateromichael@gmail.com</a:t>
             </a:r>
@@ -12888,13 +12577,7 @@
                 <a:solidFill>
                   <a:schemeClr val="accent1"/>
                 </a:solidFill>
-                <a:hlinkClick r:id="rId5">
-                  <a:extLst>
-                    <a:ext uri="{A12FA001-AC4F-418D-AE19-62706E023703}">
-                      <ahyp:hlinkClr xmlns:ahyp="http://schemas.microsoft.com/office/drawing/2018/hyperlinkcolor" val="tx"/>
-                    </a:ext>
-                  </a:extLst>
-                </a:hlinkClick>
+                <a:hlinkClick r:id="rId4"/>
               </a:rPr>
               <a:t>noordinoordino470@gmail.com</a:t>
             </a:r>
@@ -12914,13 +12597,7 @@
                 <a:solidFill>
                   <a:schemeClr val="accent1"/>
                 </a:solidFill>
-                <a:hlinkClick r:id="rId6">
-                  <a:extLst>
-                    <a:ext uri="{A12FA001-AC4F-418D-AE19-62706E023703}">
-                      <ahyp:hlinkClr xmlns:ahyp="http://schemas.microsoft.com/office/drawing/2018/hyperlinkcolor" val="tx"/>
-                    </a:ext>
-                  </a:extLst>
-                </a:hlinkClick>
+                <a:hlinkClick r:id="rId5"/>
               </a:rPr>
               <a:t>kennethnyangweso99@gmail.com</a:t>
             </a:r>
@@ -12964,6 +12641,11 @@
               </a:rPr>
               <a:t>segomich227@gmail.com</a:t>
             </a:r>
+            <a:endParaRPr lang="en-US" u="sng" dirty="0">
+              <a:solidFill>
+                <a:schemeClr val="accent1"/>
+              </a:solidFill>
+            </a:endParaRPr>
           </a:p>
           <a:p>
             <a:pPr marL="342900" indent="-342900">
@@ -13016,7 +12698,6 @@
           <a:p>
             <a:fld id="{C4C7283F-616F-4503-ABBD-21FFB2848302}" type="slidenum">
               <a:rPr lang="en-US" smtClean="0"/>
-              <a:t>30</a:t>
             </a:fld>
             <a:endParaRPr lang="en-US"/>
           </a:p>
@@ -13068,6 +12749,7 @@
               <a:rPr lang="en-US" sz="4400" dirty="0"/>
               <a:t>DATA UNDERSTANDING</a:t>
             </a:r>
+            <a:endParaRPr lang="en-US" sz="4400" dirty="0"/>
           </a:p>
         </p:txBody>
       </p:sp>
@@ -13103,6 +12785,9 @@
               </a:rPr>
               <a:t>Here will need to understand our data. This involves getting the relevant information from each dataset crucial for our analysis.</a:t>
             </a:r>
+            <a:endParaRPr lang="en-GB" sz="2600" b="0" i="0" dirty="0">
+              <a:effectLst/>
+            </a:endParaRPr>
           </a:p>
           <a:p>
             <a:pPr algn="l">
@@ -13115,6 +12800,9 @@
               </a:rPr>
               <a:t>We start by loading the various datasets reviewing their various information based on the columns and check which information is necessary for our analysis before beginning the data cleaning.</a:t>
             </a:r>
+            <a:endParaRPr lang="en-GB" sz="2600" b="0" i="0" dirty="0">
+              <a:effectLst/>
+            </a:endParaRPr>
           </a:p>
           <a:p>
             <a:pPr marL="0" indent="0" algn="l">
@@ -13213,6 +12901,11 @@
               </a:rPr>
               <a:t> trends in revenue over time.</a:t>
             </a:r>
+            <a:endParaRPr lang="en-US" sz="2600" kern="100" dirty="0">
+              <a:effectLst/>
+              <a:ea typeface="Calibri" panose="020F0502020204030204" pitchFamily="34" charset="0"/>
+              <a:cs typeface="Times New Roman" panose="02020603050405020304" pitchFamily="18" charset="0"/>
+            </a:endParaRPr>
           </a:p>
           <a:p>
             <a:endParaRPr lang="en-US" dirty="0"/>
@@ -13259,7 +12952,6 @@
           <a:p>
             <a:fld id="{C4C7283F-616F-4503-ABBD-21FFB2848302}" type="slidenum">
               <a:rPr lang="en-US" smtClean="0"/>
-              <a:t>4</a:t>
             </a:fld>
             <a:endParaRPr lang="en-US"/>
           </a:p>
@@ -13375,6 +13067,12 @@
               </a:rPr>
               <a:t>: Aggregated weekend earnings, helpful for identifying peaks in movie viewership.</a:t>
             </a:r>
+            <a:endParaRPr lang="en-US" sz="2400" kern="100" dirty="0">
+              <a:effectLst/>
+              <a:latin typeface="Calibri" panose="020F0502020204030204" pitchFamily="34" charset="0"/>
+              <a:ea typeface="Calibri" panose="020F0502020204030204" pitchFamily="34" charset="0"/>
+              <a:cs typeface="Times New Roman" panose="02020603050405020304" pitchFamily="18" charset="0"/>
+            </a:endParaRPr>
           </a:p>
           <a:p>
             <a:pPr marL="342900" lvl="0" indent="-342900">
@@ -13409,6 +13107,12 @@
               </a:rPr>
               <a:t>: Total earnings over time for each movie.</a:t>
             </a:r>
+            <a:endParaRPr lang="en-US" sz="2400" kern="100" dirty="0">
+              <a:effectLst/>
+              <a:latin typeface="Calibri" panose="020F0502020204030204" pitchFamily="34" charset="0"/>
+              <a:ea typeface="Calibri" panose="020F0502020204030204" pitchFamily="34" charset="0"/>
+              <a:cs typeface="Times New Roman" panose="02020603050405020304" pitchFamily="18" charset="0"/>
+            </a:endParaRPr>
           </a:p>
           <a:p>
             <a:pPr>
@@ -13468,6 +13172,12 @@
               </a:rPr>
               <a:t>: Basic information about movies, such as title, genre, release date, and distributor.</a:t>
             </a:r>
+            <a:endParaRPr lang="en-US" sz="2400" kern="100" dirty="0">
+              <a:effectLst/>
+              <a:latin typeface="Calibri" panose="020F0502020204030204" pitchFamily="34" charset="0"/>
+              <a:ea typeface="Calibri" panose="020F0502020204030204" pitchFamily="34" charset="0"/>
+              <a:cs typeface="Times New Roman" panose="02020603050405020304" pitchFamily="18" charset="0"/>
+            </a:endParaRPr>
           </a:p>
           <a:p>
             <a:pPr marL="342900" lvl="0" indent="-342900">
@@ -13520,6 +13230,12 @@
               </a:rPr>
               <a:t> how genres or ratings affect performance</a:t>
             </a:r>
+            <a:endParaRPr lang="en-US" sz="2400" kern="100" dirty="0">
+              <a:effectLst/>
+              <a:latin typeface="Calibri" panose="020F0502020204030204" pitchFamily="34" charset="0"/>
+              <a:ea typeface="Calibri" panose="020F0502020204030204" pitchFamily="34" charset="0"/>
+              <a:cs typeface="Times New Roman" panose="02020603050405020304" pitchFamily="18" charset="0"/>
+            </a:endParaRPr>
           </a:p>
           <a:p>
             <a:pPr>
@@ -13597,6 +13313,12 @@
               </a:rPr>
               <a:t> revenue streams.</a:t>
             </a:r>
+            <a:endParaRPr lang="en-US" sz="2400" kern="100" dirty="0">
+              <a:effectLst/>
+              <a:latin typeface="Calibri" panose="020F0502020204030204" pitchFamily="34" charset="0"/>
+              <a:ea typeface="Calibri" panose="020F0502020204030204" pitchFamily="34" charset="0"/>
+              <a:cs typeface="Times New Roman" panose="02020603050405020304" pitchFamily="18" charset="0"/>
+            </a:endParaRPr>
           </a:p>
           <a:p>
             <a:pPr marL="342900" lvl="0" indent="-342900">
@@ -13631,6 +13353,12 @@
               </a:rPr>
               <a:t>: Can show trends in digital distribution.</a:t>
             </a:r>
+            <a:endParaRPr lang="en-US" sz="2400" kern="100" dirty="0">
+              <a:effectLst/>
+              <a:latin typeface="Calibri" panose="020F0502020204030204" pitchFamily="34" charset="0"/>
+              <a:ea typeface="Calibri" panose="020F0502020204030204" pitchFamily="34" charset="0"/>
+              <a:cs typeface="Times New Roman" panose="02020603050405020304" pitchFamily="18" charset="0"/>
+            </a:endParaRPr>
           </a:p>
           <a:p>
             <a:pPr>
@@ -13708,6 +13436,12 @@
               </a:rPr>
               <a:t> how different studios perform over time.</a:t>
             </a:r>
+            <a:endParaRPr lang="en-US" sz="2400" kern="100" dirty="0">
+              <a:effectLst/>
+              <a:latin typeface="Calibri" panose="020F0502020204030204" pitchFamily="34" charset="0"/>
+              <a:ea typeface="Calibri" panose="020F0502020204030204" pitchFamily="34" charset="0"/>
+              <a:cs typeface="Times New Roman" panose="02020603050405020304" pitchFamily="18" charset="0"/>
+            </a:endParaRPr>
           </a:p>
           <a:p>
             <a:pPr marL="342900" lvl="0" indent="-342900">
@@ -13742,6 +13476,12 @@
               </a:rPr>
               <a:t>: Useful for cross-region comparison and global trends.</a:t>
             </a:r>
+            <a:endParaRPr lang="en-US" sz="2400" kern="100" dirty="0">
+              <a:effectLst/>
+              <a:latin typeface="Calibri" panose="020F0502020204030204" pitchFamily="34" charset="0"/>
+              <a:ea typeface="Calibri" panose="020F0502020204030204" pitchFamily="34" charset="0"/>
+              <a:cs typeface="Times New Roman" panose="02020603050405020304" pitchFamily="18" charset="0"/>
+            </a:endParaRPr>
           </a:p>
           <a:p>
             <a:endParaRPr lang="en-US" sz="2400" dirty="0"/>
@@ -13788,7 +13528,6 @@
           <a:p>
             <a:fld id="{C4C7283F-616F-4503-ABBD-21FFB2848302}" type="slidenum">
               <a:rPr lang="en-US" smtClean="0"/>
-              <a:t>5</a:t>
             </a:fld>
             <a:endParaRPr lang="en-US"/>
           </a:p>
@@ -13807,13 +13546,7 @@
   <p:cSld>
     <p:spTree>
       <p:nvGrpSpPr>
-        <p:cNvPr id="1" name="">
-          <a:extLst>
-            <a:ext uri="{FF2B5EF4-FFF2-40B4-BE49-F238E27FC236}">
-              <a16:creationId xmlns:a16="http://schemas.microsoft.com/office/drawing/2014/main" id="{5F71A741-1866-BE9D-1689-526BF1377095}"/>
-            </a:ext>
-          </a:extLst>
-        </p:cNvPr>
+        <p:cNvPr id="1" name=""/>
         <p:cNvGrpSpPr/>
         <p:nvPr/>
       </p:nvGrpSpPr>
@@ -13827,13 +13560,7 @@
       </p:grpSpPr>
       <p:sp>
         <p:nvSpPr>
-          <p:cNvPr id="2" name="Title 1">
-            <a:extLst>
-              <a:ext uri="{FF2B5EF4-FFF2-40B4-BE49-F238E27FC236}">
-                <a16:creationId xmlns:a16="http://schemas.microsoft.com/office/drawing/2014/main" id="{D10063C4-F501-0181-0B08-31F22A1144E2}"/>
-              </a:ext>
-            </a:extLst>
-          </p:cNvPr>
+          <p:cNvPr id="2" name="Title 1"/>
           <p:cNvSpPr>
             <a:spLocks noGrp="1"/>
           </p:cNvSpPr>
@@ -13864,13 +13591,7 @@
       </p:sp>
       <p:sp>
         <p:nvSpPr>
-          <p:cNvPr id="3" name="Content Placeholder 2">
-            <a:extLst>
-              <a:ext uri="{FF2B5EF4-FFF2-40B4-BE49-F238E27FC236}">
-                <a16:creationId xmlns:a16="http://schemas.microsoft.com/office/drawing/2014/main" id="{F1D6CB4C-100B-13FD-D923-C26B3C28BEB1}"/>
-              </a:ext>
-            </a:extLst>
-          </p:cNvPr>
+          <p:cNvPr id="3" name="Content Placeholder 2"/>
           <p:cNvSpPr>
             <a:spLocks noGrp="1"/>
           </p:cNvSpPr>
@@ -13922,6 +13643,12 @@
               </a:rPr>
               <a:t>: Aggregated weekend earnings, helpful for identifying peaks in movie viewership.</a:t>
             </a:r>
+            <a:endParaRPr lang="en-US" sz="2400" kern="100" dirty="0">
+              <a:effectLst/>
+              <a:latin typeface="Calibri" panose="020F0502020204030204" pitchFamily="34" charset="0"/>
+              <a:ea typeface="Calibri" panose="020F0502020204030204" pitchFamily="34" charset="0"/>
+              <a:cs typeface="Times New Roman" panose="02020603050405020304" pitchFamily="18" charset="0"/>
+            </a:endParaRPr>
           </a:p>
           <a:p>
             <a:pPr marL="342900" lvl="0" indent="-342900">
@@ -13956,6 +13683,12 @@
               </a:rPr>
               <a:t>: Total earnings over time for each movie.</a:t>
             </a:r>
+            <a:endParaRPr lang="en-US" sz="2400" kern="100" dirty="0">
+              <a:effectLst/>
+              <a:latin typeface="Calibri" panose="020F0502020204030204" pitchFamily="34" charset="0"/>
+              <a:ea typeface="Calibri" panose="020F0502020204030204" pitchFamily="34" charset="0"/>
+              <a:cs typeface="Times New Roman" panose="02020603050405020304" pitchFamily="18" charset="0"/>
+            </a:endParaRPr>
           </a:p>
           <a:p>
             <a:pPr>
@@ -14015,6 +13748,12 @@
               </a:rPr>
               <a:t>: Basic information about movies, such as title, genre, release date, and distributor.</a:t>
             </a:r>
+            <a:endParaRPr lang="en-US" sz="2400" kern="100" dirty="0">
+              <a:effectLst/>
+              <a:latin typeface="Calibri" panose="020F0502020204030204" pitchFamily="34" charset="0"/>
+              <a:ea typeface="Calibri" panose="020F0502020204030204" pitchFamily="34" charset="0"/>
+              <a:cs typeface="Times New Roman" panose="02020603050405020304" pitchFamily="18" charset="0"/>
+            </a:endParaRPr>
           </a:p>
           <a:p>
             <a:pPr marL="342900" lvl="0" indent="-342900">
@@ -14067,6 +13806,12 @@
               </a:rPr>
               <a:t> how genres or ratings affect performance</a:t>
             </a:r>
+            <a:endParaRPr lang="en-US" sz="2400" kern="100" dirty="0">
+              <a:effectLst/>
+              <a:latin typeface="Calibri" panose="020F0502020204030204" pitchFamily="34" charset="0"/>
+              <a:ea typeface="Calibri" panose="020F0502020204030204" pitchFamily="34" charset="0"/>
+              <a:cs typeface="Times New Roman" panose="02020603050405020304" pitchFamily="18" charset="0"/>
+            </a:endParaRPr>
           </a:p>
           <a:p>
             <a:endParaRPr lang="en-US" sz="2400" dirty="0"/>
@@ -14075,13 +13820,7 @@
       </p:sp>
       <p:sp>
         <p:nvSpPr>
-          <p:cNvPr id="4" name="Footer Placeholder 3">
-            <a:extLst>
-              <a:ext uri="{FF2B5EF4-FFF2-40B4-BE49-F238E27FC236}">
-                <a16:creationId xmlns:a16="http://schemas.microsoft.com/office/drawing/2014/main" id="{05BC2521-0F80-F607-0DFE-36A91836D3CA}"/>
-              </a:ext>
-            </a:extLst>
-          </p:cNvPr>
+          <p:cNvPr id="4" name="Footer Placeholder 3"/>
           <p:cNvSpPr>
             <a:spLocks noGrp="1"/>
           </p:cNvSpPr>
@@ -14104,13 +13843,7 @@
       </p:sp>
       <p:sp>
         <p:nvSpPr>
-          <p:cNvPr id="5" name="Slide Number Placeholder 4">
-            <a:extLst>
-              <a:ext uri="{FF2B5EF4-FFF2-40B4-BE49-F238E27FC236}">
-                <a16:creationId xmlns:a16="http://schemas.microsoft.com/office/drawing/2014/main" id="{1305BB71-AAC0-0A93-BF4C-9EC17BEFDB2D}"/>
-              </a:ext>
-            </a:extLst>
-          </p:cNvPr>
+          <p:cNvPr id="5" name="Slide Number Placeholder 4"/>
           <p:cNvSpPr>
             <a:spLocks noGrp="1"/>
           </p:cNvSpPr>
@@ -14125,18 +13858,12 @@
           <a:p>
             <a:fld id="{C4C7283F-616F-4503-ABBD-21FFB2848302}" type="slidenum">
               <a:rPr lang="en-US" smtClean="0"/>
-              <a:t>6</a:t>
             </a:fld>
             <a:endParaRPr lang="en-US"/>
           </a:p>
         </p:txBody>
       </p:sp>
     </p:spTree>
-    <p:extLst>
-      <p:ext uri="{BB962C8B-B14F-4D97-AF65-F5344CB8AC3E}">
-        <p14:creationId xmlns:p14="http://schemas.microsoft.com/office/powerpoint/2010/main" val="3489385531"/>
-      </p:ext>
-    </p:extLst>
   </p:cSld>
   <p:clrMapOvr>
     <a:masterClrMapping/>
@@ -14180,6 +13907,7 @@
               <a:rPr lang="en-US" dirty="0"/>
               <a:t>DATA UNDERSTANDING  CONT…….2</a:t>
             </a:r>
+            <a:endParaRPr lang="en-US" dirty="0"/>
           </a:p>
         </p:txBody>
       </p:sp>
@@ -14258,6 +13986,11 @@
               </a:rPr>
               <a:t>: Useful for understanding post-theatre revenue streams.</a:t>
             </a:r>
+            <a:endParaRPr lang="en-US" sz="2200" kern="100" dirty="0">
+              <a:effectLst/>
+              <a:ea typeface="Calibri" panose="020F0502020204030204" pitchFamily="34" charset="0"/>
+              <a:cs typeface="Calibri" panose="020F0502020204030204" pitchFamily="34" charset="0"/>
+            </a:endParaRPr>
           </a:p>
           <a:p>
             <a:pPr marL="342900" lvl="0" indent="-342900">
@@ -14290,6 +14023,11 @@
               </a:rPr>
               <a:t>: Can show trends in digital distribution.</a:t>
             </a:r>
+            <a:endParaRPr lang="en-US" sz="2200" kern="100" dirty="0">
+              <a:effectLst/>
+              <a:ea typeface="Calibri" panose="020F0502020204030204" pitchFamily="34" charset="0"/>
+              <a:cs typeface="Calibri" panose="020F0502020204030204" pitchFamily="34" charset="0"/>
+            </a:endParaRPr>
           </a:p>
           <a:p>
             <a:pPr>
@@ -14345,6 +14083,11 @@
               </a:rPr>
               <a:t>: Helps analyse how different studios perform over time.</a:t>
             </a:r>
+            <a:endParaRPr lang="en-US" sz="2200" kern="100" dirty="0">
+              <a:effectLst/>
+              <a:ea typeface="Calibri" panose="020F0502020204030204" pitchFamily="34" charset="0"/>
+              <a:cs typeface="Calibri" panose="020F0502020204030204" pitchFamily="34" charset="0"/>
+            </a:endParaRPr>
           </a:p>
           <a:p>
             <a:pPr marL="342900" lvl="0" indent="-342900">
@@ -14377,6 +14120,11 @@
               </a:rPr>
               <a:t>: Useful for cross-region comparison and global trends.</a:t>
             </a:r>
+            <a:endParaRPr lang="en-US" sz="2200" kern="100" dirty="0">
+              <a:effectLst/>
+              <a:ea typeface="Calibri" panose="020F0502020204030204" pitchFamily="34" charset="0"/>
+              <a:cs typeface="Calibri" panose="020F0502020204030204" pitchFamily="34" charset="0"/>
+            </a:endParaRPr>
           </a:p>
           <a:p>
             <a:endParaRPr lang="en-US" dirty="0">
@@ -14426,7 +14174,6 @@
           <a:p>
             <a:fld id="{C4C7283F-616F-4503-ABBD-21FFB2848302}" type="slidenum">
               <a:rPr lang="en-US" smtClean="0"/>
-              <a:t>7</a:t>
             </a:fld>
             <a:endParaRPr lang="en-US"/>
           </a:p>
@@ -14481,6 +14228,7 @@
               <a:rPr lang="en-US" b="1" dirty="0"/>
               <a:t>OBJECTIVES/GOALS</a:t>
             </a:r>
+            <a:endParaRPr lang="en-US" b="1" dirty="0"/>
           </a:p>
         </p:txBody>
       </p:sp>
@@ -14518,6 +14266,14 @@
               </a:rPr>
               <a:t>Main Objective</a:t>
             </a:r>
+            <a:endParaRPr lang="en-GB" sz="3200" b="1" kern="100" dirty="0">
+              <a:solidFill>
+                <a:schemeClr val="accent1"/>
+              </a:solidFill>
+              <a:effectLst/>
+              <a:ea typeface="Calibri" panose="020F0502020204030204" pitchFamily="34" charset="0"/>
+              <a:cs typeface="Times New Roman" panose="02020603050405020304" pitchFamily="18" charset="0"/>
+            </a:endParaRPr>
           </a:p>
           <a:p>
             <a:pPr algn="l"/>
@@ -14529,6 +14285,11 @@
               </a:rPr>
               <a:t>- To analyse movie data and uncover key patterns in revenue, popularity, ratings, and director influence across genres, providing actionable insights for business growth and strategic decision-making.</a:t>
             </a:r>
+            <a:endParaRPr lang="en-GB" sz="2000" kern="100" dirty="0">
+              <a:effectLst/>
+              <a:ea typeface="Calibri" panose="020F0502020204030204" pitchFamily="34" charset="0"/>
+              <a:cs typeface="Times New Roman" panose="02020603050405020304" pitchFamily="18" charset="0"/>
+            </a:endParaRPr>
           </a:p>
           <a:p>
             <a:pPr algn="l"/>
@@ -14588,7 +14349,6 @@
           <a:p>
             <a:fld id="{C4C7283F-616F-4503-ABBD-21FFB2848302}" type="slidenum">
               <a:rPr lang="en-US" smtClean="0"/>
-              <a:t>8</a:t>
             </a:fld>
             <a:endParaRPr lang="en-US"/>
           </a:p>
@@ -14607,13 +14367,7 @@
   <p:cSld>
     <p:spTree>
       <p:nvGrpSpPr>
-        <p:cNvPr id="1" name="">
-          <a:extLst>
-            <a:ext uri="{FF2B5EF4-FFF2-40B4-BE49-F238E27FC236}">
-              <a16:creationId xmlns:a16="http://schemas.microsoft.com/office/drawing/2014/main" id="{E339B129-2444-9A20-197F-DD016E41233B}"/>
-            </a:ext>
-          </a:extLst>
-        </p:cNvPr>
+        <p:cNvPr id="1" name=""/>
         <p:cNvGrpSpPr/>
         <p:nvPr/>
       </p:nvGrpSpPr>
@@ -14627,13 +14381,7 @@
       </p:grpSpPr>
       <p:sp>
         <p:nvSpPr>
-          <p:cNvPr id="2" name="Title 1">
-            <a:extLst>
-              <a:ext uri="{FF2B5EF4-FFF2-40B4-BE49-F238E27FC236}">
-                <a16:creationId xmlns:a16="http://schemas.microsoft.com/office/drawing/2014/main" id="{1DAFECB4-09DA-00A9-8FF3-0064F4F77340}"/>
-              </a:ext>
-            </a:extLst>
-          </p:cNvPr>
+          <p:cNvPr id="2" name="Title 1"/>
           <p:cNvSpPr>
             <a:spLocks noGrp="1"/>
           </p:cNvSpPr>
@@ -14664,18 +14412,13 @@
               <a:rPr lang="en-US" b="1" dirty="0"/>
               <a:t>…2)</a:t>
             </a:r>
-          </a:p>
-        </p:txBody>
-      </p:sp>
-      <p:sp>
-        <p:nvSpPr>
-          <p:cNvPr id="3" name="Subtitle 2">
-            <a:extLst>
-              <a:ext uri="{FF2B5EF4-FFF2-40B4-BE49-F238E27FC236}">
-                <a16:creationId xmlns:a16="http://schemas.microsoft.com/office/drawing/2014/main" id="{5935E2C6-1DBC-636E-503A-6CCBC52FD376}"/>
-              </a:ext>
-            </a:extLst>
-          </p:cNvPr>
+            <a:endParaRPr lang="en-US" b="1" dirty="0"/>
+          </a:p>
+        </p:txBody>
+      </p:sp>
+      <p:sp>
+        <p:nvSpPr>
+          <p:cNvPr id="3" name="Subtitle 2"/>
           <p:cNvSpPr>
             <a:spLocks noGrp="1"/>
           </p:cNvSpPr>
@@ -14715,6 +14458,14 @@
               </a:rPr>
               <a:t>Specific Objectives</a:t>
             </a:r>
+            <a:endParaRPr lang="en-GB" sz="3600" b="1" kern="100" dirty="0">
+              <a:solidFill>
+                <a:schemeClr val="accent1"/>
+              </a:solidFill>
+              <a:effectLst/>
+              <a:ea typeface="Calibri" panose="020F0502020204030204" pitchFamily="34" charset="0"/>
+              <a:cs typeface="Times New Roman" panose="02020603050405020304" pitchFamily="18" charset="0"/>
+            </a:endParaRPr>
           </a:p>
           <a:p>
             <a:pPr algn="l"/>
@@ -14726,6 +14477,11 @@
               </a:rPr>
               <a:t>1. Identify the movie genres that generate the highest revenue and analyse the factors contributing to their financial success.</a:t>
             </a:r>
+            <a:endParaRPr lang="en-GB" sz="2200" kern="100" dirty="0">
+              <a:effectLst/>
+              <a:ea typeface="Calibri" panose="020F0502020204030204" pitchFamily="34" charset="0"/>
+              <a:cs typeface="Times New Roman" panose="02020603050405020304" pitchFamily="18" charset="0"/>
+            </a:endParaRPr>
           </a:p>
           <a:p>
             <a:pPr algn="l"/>
@@ -14737,6 +14493,11 @@
               </a:rPr>
               <a:t>2. Explore audience preferences to uncover the most popular genres and the drivers behind their popularity.</a:t>
             </a:r>
+            <a:endParaRPr lang="en-GB" sz="2200" kern="100" dirty="0">
+              <a:effectLst/>
+              <a:ea typeface="Calibri" panose="020F0502020204030204" pitchFamily="34" charset="0"/>
+              <a:cs typeface="Times New Roman" panose="02020603050405020304" pitchFamily="18" charset="0"/>
+            </a:endParaRPr>
           </a:p>
           <a:p>
             <a:pPr algn="l"/>
@@ -14748,6 +14509,11 @@
               </a:rPr>
               <a:t>3. Evaluate the ratings of movies across genres to assess trends in critical and audience reception.</a:t>
             </a:r>
+            <a:endParaRPr lang="en-GB" sz="2200" kern="100" dirty="0">
+              <a:effectLst/>
+              <a:ea typeface="Calibri" panose="020F0502020204030204" pitchFamily="34" charset="0"/>
+              <a:cs typeface="Times New Roman" panose="02020603050405020304" pitchFamily="18" charset="0"/>
+            </a:endParaRPr>
           </a:p>
           <a:p>
             <a:pPr algn="l"/>
@@ -14759,6 +14525,11 @@
               </a:rPr>
               <a:t>4. Examine the role and impact of directors on the success of specific genres.</a:t>
             </a:r>
+            <a:endParaRPr lang="en-GB" sz="2200" kern="100" dirty="0">
+              <a:effectLst/>
+              <a:ea typeface="Calibri" panose="020F0502020204030204" pitchFamily="34" charset="0"/>
+              <a:cs typeface="Times New Roman" panose="02020603050405020304" pitchFamily="18" charset="0"/>
+            </a:endParaRPr>
           </a:p>
           <a:p>
             <a:pPr algn="l"/>
@@ -14770,6 +14541,11 @@
               </a:rPr>
               <a:t>5. Identify top-performing movies within their respective genres.</a:t>
             </a:r>
+            <a:endParaRPr lang="en-GB" sz="2200" kern="100" dirty="0">
+              <a:effectLst/>
+              <a:ea typeface="Calibri" panose="020F0502020204030204" pitchFamily="34" charset="0"/>
+              <a:cs typeface="Times New Roman" panose="02020603050405020304" pitchFamily="18" charset="0"/>
+            </a:endParaRPr>
           </a:p>
           <a:p>
             <a:pPr algn="l"/>
@@ -14781,18 +14557,17 @@
               </a:rPr>
               <a:t>6. Highlight the most successful and influential directors based on revenue and popularity.</a:t>
             </a:r>
-          </a:p>
-        </p:txBody>
-      </p:sp>
-      <p:sp>
-        <p:nvSpPr>
-          <p:cNvPr id="4" name="Footer Placeholder 3">
-            <a:extLst>
-              <a:ext uri="{FF2B5EF4-FFF2-40B4-BE49-F238E27FC236}">
-                <a16:creationId xmlns:a16="http://schemas.microsoft.com/office/drawing/2014/main" id="{BDF402D0-90CD-9943-84DE-4528077D08A5}"/>
-              </a:ext>
-            </a:extLst>
-          </p:cNvPr>
+            <a:endParaRPr lang="en-GB" sz="2200" kern="100" dirty="0">
+              <a:effectLst/>
+              <a:ea typeface="Calibri" panose="020F0502020204030204" pitchFamily="34" charset="0"/>
+              <a:cs typeface="Times New Roman" panose="02020603050405020304" pitchFamily="18" charset="0"/>
+            </a:endParaRPr>
+          </a:p>
+        </p:txBody>
+      </p:sp>
+      <p:sp>
+        <p:nvSpPr>
+          <p:cNvPr id="4" name="Footer Placeholder 3"/>
           <p:cNvSpPr>
             <a:spLocks noGrp="1"/>
           </p:cNvSpPr>
@@ -14820,13 +14595,7 @@
       </p:sp>
       <p:sp>
         <p:nvSpPr>
-          <p:cNvPr id="5" name="Slide Number Placeholder 4">
-            <a:extLst>
-              <a:ext uri="{FF2B5EF4-FFF2-40B4-BE49-F238E27FC236}">
-                <a16:creationId xmlns:a16="http://schemas.microsoft.com/office/drawing/2014/main" id="{DB0D763D-CB8A-F87E-1622-4CBA4E1E241B}"/>
-              </a:ext>
-            </a:extLst>
-          </p:cNvPr>
+          <p:cNvPr id="5" name="Slide Number Placeholder 4"/>
           <p:cNvSpPr>
             <a:spLocks noGrp="1"/>
           </p:cNvSpPr>
@@ -14841,18 +14610,12 @@
           <a:p>
             <a:fld id="{C4C7283F-616F-4503-ABBD-21FFB2848302}" type="slidenum">
               <a:rPr lang="en-US" smtClean="0"/>
-              <a:t>9</a:t>
             </a:fld>
             <a:endParaRPr lang="en-US"/>
           </a:p>
         </p:txBody>
       </p:sp>
     </p:spTree>
-    <p:extLst>
-      <p:ext uri="{BB962C8B-B14F-4D97-AF65-F5344CB8AC3E}">
-        <p14:creationId xmlns:p14="http://schemas.microsoft.com/office/powerpoint/2010/main" val="1160217562"/>
-      </p:ext>
-    </p:extLst>
   </p:cSld>
   <p:clrMapOvr>
     <a:masterClrMapping/>
@@ -15107,8 +14870,6 @@
       </a:bgFillStyleLst>
     </a:fmtScheme>
   </a:themeElements>
-  <a:objectDefaults/>
-  <a:extraClrSchemeLst/>
   <a:extLst>
     <a:ext uri="{05A4C25C-085E-4340-85A3-A5531E510DB2}">
       <thm15:themeFamily xmlns:thm15="http://schemas.microsoft.com/office/thememl/2012/main" name="Office Theme" id="{62F939B6-93AF-4DB8-9C6B-D6C7DFDC589F}" vid="{4A3C46E8-61CC-4603-A589-7422A47A8E4A}"/>
@@ -15368,8 +15129,6 @@
       </a:bgFillStyleLst>
     </a:fmtScheme>
   </a:themeElements>
-  <a:objectDefaults/>
-  <a:extraClrSchemeLst/>
   <a:extLst>
     <a:ext uri="{05A4C25C-085E-4340-85A3-A5531E510DB2}">
       <thm15:themeFamily xmlns:thm15="http://schemas.microsoft.com/office/thememl/2012/main" name="Office Theme" id="{62F939B6-93AF-4DB8-9C6B-D6C7DFDC589F}" vid="{4A3C46E8-61CC-4603-A589-7422A47A8E4A}"/>

</xml_diff>